<commit_message>
Fixed issue with Disjoint vs surrounds definition
</commit_message>
<xml_diff>
--- a/docs/RelationshipTreeDiagram.pptx
+++ b/docs/RelationshipTreeDiagram.pptx
@@ -4,6 +4,9 @@
   <p:sldMasterIdLst>
     <p:sldMasterId id="2147483648" r:id="rId1"/>
   </p:sldMasterIdLst>
+  <p:notesMasterIdLst>
+    <p:notesMasterId r:id="rId4"/>
+  </p:notesMasterIdLst>
   <p:sldIdLst>
     <p:sldId id="259" r:id="rId2"/>
     <p:sldId id="258" r:id="rId3"/>
@@ -1938,18 +1941,18 @@
       </dgm:t>
     </dgm:pt>
     <dgm:pt modelId="{4BEC090C-1E15-4161-8659-B6B7DA165CC0}">
-      <dgm:prSet phldrT="[Text]"/>
+      <dgm:prSet phldrT="[Text]" custT="1"/>
       <dgm:spPr/>
       <dgm:t>
         <a:bodyPr/>
         <a:lstStyle/>
         <a:p>
           <a:r>
-            <a:rPr lang="en-US" dirty="0"/>
+            <a:rPr lang="en-US" sz="1400" dirty="0"/>
             <a:t>Do the interiors of </a:t>
           </a:r>
           <a:r>
-            <a:rPr lang="en-US" b="1" dirty="0">
+            <a:rPr lang="en-US" sz="1400" b="1" dirty="0">
               <a:solidFill>
                 <a:srgbClr val="00B0F0"/>
               </a:solidFill>
@@ -1957,11 +1960,11 @@
             <a:t>A</a:t>
           </a:r>
           <a:r>
-            <a:rPr lang="en-US" dirty="0"/>
+            <a:rPr lang="en-US" sz="1400" dirty="0"/>
             <a:t> and </a:t>
           </a:r>
           <a:r>
-            <a:rPr lang="en-US" b="1" dirty="0">
+            <a:rPr lang="en-US" sz="1400" b="1" dirty="0">
               <a:solidFill>
                 <a:srgbClr val="00B050"/>
               </a:solidFill>
@@ -1969,7 +1972,7 @@
             <a:t>B </a:t>
           </a:r>
           <a:r>
-            <a:rPr lang="en-US" dirty="0"/>
+            <a:rPr lang="en-US" sz="1400" dirty="0"/>
             <a:t>overlap?</a:t>
           </a:r>
         </a:p>
@@ -1998,22 +2001,22 @@
       </dgm:t>
     </dgm:pt>
     <dgm:pt modelId="{7A3D1130-4F69-4E59-9ACC-5B640EBD6EFF}">
-      <dgm:prSet phldrT="[Text]"/>
+      <dgm:prSet phldrT="[Text]" custT="1"/>
       <dgm:spPr/>
       <dgm:t>
         <a:bodyPr/>
         <a:lstStyle/>
         <a:p>
           <a:r>
-            <a:rPr lang="en-CA" dirty="0"/>
+            <a:rPr lang="en-CA" sz="1400" dirty="0"/>
             <a:t>Does the external boundary </a:t>
           </a:r>
           <a:r>
-            <a:rPr lang="en-US" dirty="0"/>
+            <a:rPr lang="en-US" sz="1400" dirty="0"/>
             <a:t>of </a:t>
           </a:r>
           <a:r>
-            <a:rPr lang="en-US" b="1" dirty="0">
+            <a:rPr lang="en-US" sz="1400" b="1" dirty="0">
               <a:solidFill>
                 <a:srgbClr val="00B0F0"/>
               </a:solidFill>
@@ -2021,11 +2024,11 @@
             <a:t>A </a:t>
           </a:r>
           <a:r>
-            <a:rPr lang="en-US" dirty="0"/>
-            <a:t>encompass </a:t>
-          </a:r>
-          <a:r>
-            <a:rPr lang="en-US" b="1" dirty="0">
+            <a:rPr lang="en-US" sz="1400" dirty="0"/>
+            <a:t>encompass all of </a:t>
+          </a:r>
+          <a:r>
+            <a:rPr lang="en-US" sz="1400" b="1" dirty="0">
               <a:solidFill>
                 <a:srgbClr val="00B050"/>
               </a:solidFill>
@@ -2033,10 +2036,10 @@
             <a:t>B</a:t>
           </a:r>
           <a:r>
-            <a:rPr lang="en-US" dirty="0"/>
+            <a:rPr lang="en-US" sz="1400" dirty="0"/>
             <a:t>?</a:t>
           </a:r>
-          <a:endParaRPr lang="en-CA" b="1" dirty="0">
+          <a:endParaRPr lang="en-CA" sz="1400" b="1" dirty="0">
             <a:solidFill>
               <a:srgbClr val="00B050"/>
             </a:solidFill>
@@ -2097,7 +2100,7 @@
       </dgm:t>
     </dgm:pt>
     <dgm:pt modelId="{181C735C-A399-4DA3-8589-B01A149985B6}">
-      <dgm:prSet phldrT="[Text]"/>
+      <dgm:prSet phldrT="[Text]" custT="1"/>
       <dgm:spPr>
         <a:ln w="38100">
           <a:solidFill>
@@ -2131,7 +2134,7 @@
         <a:lstStyle/>
         <a:p>
           <a:r>
-            <a:rPr lang="en-US" b="1" dirty="0">
+            <a:rPr lang="en-US" sz="1400" b="1" dirty="0">
               <a:solidFill>
                 <a:srgbClr val="00B0F0"/>
               </a:solidFill>
@@ -2139,26 +2142,26 @@
             <a:t>A</a:t>
           </a:r>
           <a:r>
-            <a:rPr lang="en-US" dirty="0"/>
+            <a:rPr lang="en-US" sz="1400" dirty="0"/>
             <a:t> </a:t>
           </a:r>
           <a:r>
-            <a:rPr lang="en-CA" i="1" dirty="0"/>
+            <a:rPr lang="en-CA" sz="1400" i="1" dirty="0"/>
             <a:t>Borders</a:t>
           </a:r>
           <a:r>
-            <a:rPr lang="en-CA" dirty="0"/>
+            <a:rPr lang="en-CA" sz="1400" dirty="0"/>
             <a:t> </a:t>
           </a:r>
           <a:r>
-            <a:rPr lang="en-US" b="1" dirty="0">
+            <a:rPr lang="en-US" sz="1400" b="1" dirty="0">
               <a:solidFill>
                 <a:srgbClr val="00B050"/>
               </a:solidFill>
             </a:rPr>
             <a:t>B</a:t>
           </a:r>
-          <a:endParaRPr lang="en-CA" dirty="0"/>
+          <a:endParaRPr lang="en-CA" sz="1400" dirty="0"/>
         </a:p>
       </dgm:t>
     </dgm:pt>
@@ -2217,7 +2220,7 @@
       </dgm:t>
     </dgm:pt>
     <dgm:pt modelId="{77B43507-91C0-4172-8210-B7BD86829BA3}">
-      <dgm:prSet/>
+      <dgm:prSet custT="1"/>
       <dgm:spPr>
         <a:ln w="38100">
           <a:solidFill>
@@ -2252,7 +2255,7 @@
         <a:p>
           <a:pPr algn="ctr"/>
           <a:r>
-            <a:rPr lang="en-US" b="1" dirty="0">
+            <a:rPr lang="en-US" sz="1400" b="1" dirty="0">
               <a:solidFill>
                 <a:srgbClr val="00B0F0"/>
               </a:solidFill>
@@ -2260,26 +2263,26 @@
             <a:t>A</a:t>
           </a:r>
           <a:r>
-            <a:rPr lang="en-US" dirty="0"/>
+            <a:rPr lang="en-US" sz="1400" dirty="0"/>
             <a:t> </a:t>
           </a:r>
           <a:r>
-            <a:rPr lang="en-CA" i="1" dirty="0"/>
+            <a:rPr lang="en-CA" sz="1400" i="1" dirty="0"/>
             <a:t>Confines</a:t>
           </a:r>
           <a:r>
-            <a:rPr lang="en-CA" dirty="0"/>
+            <a:rPr lang="en-CA" sz="1400" dirty="0"/>
             <a:t> </a:t>
           </a:r>
           <a:r>
-            <a:rPr lang="en-US" b="1" dirty="0">
+            <a:rPr lang="en-US" sz="1400" b="1" dirty="0">
               <a:solidFill>
                 <a:srgbClr val="00B050"/>
               </a:solidFill>
             </a:rPr>
             <a:t>B</a:t>
           </a:r>
-          <a:endParaRPr lang="en-CA" dirty="0"/>
+          <a:endParaRPr lang="en-CA" sz="1400" dirty="0"/>
         </a:p>
       </dgm:t>
     </dgm:pt>
@@ -2336,18 +2339,18 @@
       </dgm:t>
     </dgm:pt>
     <dgm:pt modelId="{A41D72E9-2C78-48B5-BD7D-C1381877FD7E}">
-      <dgm:prSet phldrT="[Text]"/>
+      <dgm:prSet phldrT="[Text]" custT="1"/>
       <dgm:spPr/>
       <dgm:t>
         <a:bodyPr/>
         <a:lstStyle/>
         <a:p>
           <a:r>
-            <a:rPr lang="en-US" dirty="0"/>
+            <a:rPr lang="en-US" sz="1400" dirty="0"/>
             <a:t>Does the interior of </a:t>
           </a:r>
           <a:r>
-            <a:rPr lang="en-US" b="1" dirty="0">
+            <a:rPr lang="en-US" sz="1400" b="1" dirty="0">
               <a:solidFill>
                 <a:srgbClr val="00B0F0"/>
               </a:solidFill>
@@ -2355,11 +2358,11 @@
             <a:t>A</a:t>
           </a:r>
           <a:r>
-            <a:rPr lang="en-US" dirty="0"/>
+            <a:rPr lang="en-US" sz="1400" dirty="0"/>
             <a:t> include the exterior of </a:t>
           </a:r>
           <a:r>
-            <a:rPr lang="en-US" b="1" dirty="0">
+            <a:rPr lang="en-US" sz="1400" b="1" dirty="0">
               <a:solidFill>
                 <a:srgbClr val="00B050"/>
               </a:solidFill>
@@ -2367,10 +2370,10 @@
             <a:t>B</a:t>
           </a:r>
           <a:r>
-            <a:rPr lang="en-US" dirty="0"/>
+            <a:rPr lang="en-US" sz="1400" dirty="0"/>
             <a:t>? </a:t>
           </a:r>
-          <a:endParaRPr lang="en-CA" dirty="0"/>
+          <a:endParaRPr lang="en-CA" sz="1400" dirty="0"/>
         </a:p>
       </dgm:t>
     </dgm:pt>
@@ -2427,7 +2430,7 @@
       </dgm:t>
     </dgm:pt>
     <dgm:pt modelId="{A0B9EC76-736B-41EF-A0BF-FF6D2F0BB0BB}">
-      <dgm:prSet phldrT="[Text]"/>
+      <dgm:prSet phldrT="[Text]" custT="1"/>
       <dgm:spPr>
         <a:ln w="38100">
           <a:solidFill>
@@ -2461,7 +2464,7 @@
         <a:lstStyle/>
         <a:p>
           <a:r>
-            <a:rPr lang="en-US" b="1" dirty="0">
+            <a:rPr lang="en-US" sz="1400" b="1" dirty="0">
               <a:solidFill>
                 <a:srgbClr val="00B0F0"/>
               </a:solidFill>
@@ -2469,26 +2472,26 @@
             <a:t>A</a:t>
           </a:r>
           <a:r>
-            <a:rPr lang="en-US" dirty="0"/>
+            <a:rPr lang="en-US" sz="1400" dirty="0"/>
             <a:t> </a:t>
           </a:r>
           <a:r>
-            <a:rPr lang="en-CA" i="1" dirty="0"/>
+            <a:rPr lang="en-CA" sz="1400" i="1" dirty="0"/>
             <a:t>Contains</a:t>
           </a:r>
           <a:r>
-            <a:rPr lang="en-CA" dirty="0"/>
+            <a:rPr lang="en-CA" sz="1400" dirty="0"/>
             <a:t> </a:t>
           </a:r>
           <a:r>
-            <a:rPr lang="en-US" b="1" dirty="0">
+            <a:rPr lang="en-US" sz="1400" b="1" dirty="0">
               <a:solidFill>
                 <a:srgbClr val="00B050"/>
               </a:solidFill>
             </a:rPr>
             <a:t>B</a:t>
           </a:r>
-          <a:endParaRPr lang="en-CA" dirty="0"/>
+          <a:endParaRPr lang="en-CA" sz="1400" dirty="0"/>
         </a:p>
       </dgm:t>
     </dgm:pt>
@@ -2547,18 +2550,18 @@
       </dgm:t>
     </dgm:pt>
     <dgm:pt modelId="{0B8F6A2C-499F-4D42-90C6-D5D0C08F7746}">
-      <dgm:prSet phldrT="[Text]"/>
+      <dgm:prSet phldrT="[Text]" custT="1"/>
       <dgm:spPr/>
       <dgm:t>
         <a:bodyPr/>
         <a:lstStyle/>
         <a:p>
           <a:r>
-            <a:rPr lang="en-US" dirty="0"/>
+            <a:rPr lang="en-US" sz="1400" dirty="0"/>
             <a:t>Does the exterior of </a:t>
           </a:r>
           <a:r>
-            <a:rPr lang="en-US" b="1" dirty="0">
+            <a:rPr lang="en-US" sz="1400" b="1" dirty="0">
               <a:solidFill>
                 <a:srgbClr val="00B0F0"/>
               </a:solidFill>
@@ -2566,11 +2569,11 @@
             <a:t>A</a:t>
           </a:r>
           <a:r>
-            <a:rPr lang="en-US" dirty="0"/>
+            <a:rPr lang="en-US" sz="1400" dirty="0"/>
             <a:t> overlap with the interior of </a:t>
           </a:r>
           <a:r>
-            <a:rPr lang="en-US" b="1" dirty="0">
+            <a:rPr lang="en-US" sz="1400" b="1" dirty="0">
               <a:solidFill>
                 <a:srgbClr val="00B050"/>
               </a:solidFill>
@@ -2578,10 +2581,10 @@
             <a:t>B</a:t>
           </a:r>
           <a:r>
-            <a:rPr lang="en-US" dirty="0"/>
+            <a:rPr lang="en-US" sz="1400" dirty="0"/>
             <a:t>?  </a:t>
           </a:r>
-          <a:endParaRPr lang="en-CA" dirty="0"/>
+          <a:endParaRPr lang="en-CA" sz="1400" dirty="0"/>
         </a:p>
       </dgm:t>
     </dgm:pt>
@@ -2638,22 +2641,22 @@
       </dgm:t>
     </dgm:pt>
     <dgm:pt modelId="{4102858B-66E2-4F4D-8103-BC8FCF77C011}">
-      <dgm:prSet phldrT="[Text]"/>
+      <dgm:prSet phldrT="[Text]" custT="1"/>
       <dgm:spPr/>
       <dgm:t>
         <a:bodyPr/>
         <a:lstStyle/>
         <a:p>
           <a:r>
-            <a:rPr lang="en-CA" dirty="0"/>
+            <a:rPr lang="en-CA" sz="1400" dirty="0"/>
             <a:t>Does the external boundary </a:t>
           </a:r>
           <a:r>
-            <a:rPr lang="en-US" dirty="0"/>
+            <a:rPr lang="en-US" sz="1400" dirty="0"/>
             <a:t>of </a:t>
           </a:r>
           <a:r>
-            <a:rPr lang="en-US" b="1" dirty="0">
+            <a:rPr lang="en-US" sz="1400" b="1" dirty="0">
               <a:solidFill>
                 <a:srgbClr val="00B0F0"/>
               </a:solidFill>
@@ -2661,11 +2664,11 @@
             <a:t>A </a:t>
           </a:r>
           <a:r>
-            <a:rPr lang="en-US" dirty="0"/>
-            <a:t>encompass </a:t>
-          </a:r>
-          <a:r>
-            <a:rPr lang="en-US" b="1" dirty="0">
+            <a:rPr lang="en-US" sz="1400" dirty="0"/>
+            <a:t>encompass all of </a:t>
+          </a:r>
+          <a:r>
+            <a:rPr lang="en-US" sz="1400" b="1" dirty="0">
               <a:solidFill>
                 <a:srgbClr val="00B050"/>
               </a:solidFill>
@@ -2673,10 +2676,10 @@
             <a:t>B</a:t>
           </a:r>
           <a:r>
-            <a:rPr lang="en-US" dirty="0"/>
+            <a:rPr lang="en-US" sz="1400" dirty="0"/>
             <a:t>?</a:t>
           </a:r>
-          <a:endParaRPr lang="en-CA" dirty="0"/>
+          <a:endParaRPr lang="en-CA" sz="1400" dirty="0"/>
         </a:p>
       </dgm:t>
     </dgm:pt>
@@ -2735,7 +2738,7 @@
       </dgm:t>
     </dgm:pt>
     <dgm:pt modelId="{661FE512-40D7-433D-9F16-55C6C728AAEA}">
-      <dgm:prSet phldrT="[Text]"/>
+      <dgm:prSet phldrT="[Text]" custT="1"/>
       <dgm:spPr>
         <a:ln w="38100">
           <a:solidFill>
@@ -2769,7 +2772,7 @@
         <a:lstStyle/>
         <a:p>
           <a:r>
-            <a:rPr lang="en-US" b="1" dirty="0">
+            <a:rPr lang="en-US" sz="1400" b="1" dirty="0">
               <a:solidFill>
                 <a:srgbClr val="00B0F0"/>
               </a:solidFill>
@@ -2777,26 +2780,26 @@
             <a:t>A</a:t>
           </a:r>
           <a:r>
-            <a:rPr lang="en-US" dirty="0"/>
+            <a:rPr lang="en-US" sz="1400" dirty="0"/>
             <a:t> </a:t>
           </a:r>
           <a:r>
-            <a:rPr lang="en-CA" i="1" dirty="0"/>
+            <a:rPr lang="en-CA" sz="1400" i="1" dirty="0"/>
             <a:t>Overlaps</a:t>
           </a:r>
           <a:r>
-            <a:rPr lang="en-CA" dirty="0"/>
+            <a:rPr lang="en-CA" sz="1400" dirty="0"/>
             <a:t> </a:t>
           </a:r>
           <a:r>
-            <a:rPr lang="en-US" b="1" dirty="0">
+            <a:rPr lang="en-US" sz="1400" b="1" dirty="0">
               <a:solidFill>
                 <a:srgbClr val="00B050"/>
               </a:solidFill>
             </a:rPr>
             <a:t>B</a:t>
           </a:r>
-          <a:endParaRPr lang="en-CA" dirty="0"/>
+          <a:endParaRPr lang="en-CA" sz="1400" dirty="0"/>
         </a:p>
       </dgm:t>
     </dgm:pt>
@@ -2853,7 +2856,7 @@
       </dgm:t>
     </dgm:pt>
     <dgm:pt modelId="{76F6ED56-039E-4362-929F-14CA94C44354}">
-      <dgm:prSet phldrT="[Text]"/>
+      <dgm:prSet phldrT="[Text]" custT="1"/>
       <dgm:spPr>
         <a:ln w="38100">
           <a:solidFill>
@@ -2887,7 +2890,7 @@
         <a:lstStyle/>
         <a:p>
           <a:r>
-            <a:rPr lang="en-US" b="1" dirty="0">
+            <a:rPr lang="en-US" sz="1400" b="1" dirty="0">
               <a:solidFill>
                 <a:srgbClr val="00B0F0"/>
               </a:solidFill>
@@ -2895,26 +2898,26 @@
             <a:t>A</a:t>
           </a:r>
           <a:r>
-            <a:rPr lang="en-US" dirty="0"/>
+            <a:rPr lang="en-US" sz="1400" dirty="0"/>
             <a:t> </a:t>
           </a:r>
           <a:r>
-            <a:rPr lang="en-US" i="1" dirty="0"/>
+            <a:rPr lang="en-US" sz="1400" i="1" dirty="0"/>
             <a:t>Surrounds</a:t>
           </a:r>
           <a:r>
-            <a:rPr lang="en-US" dirty="0"/>
+            <a:rPr lang="en-US" sz="1400" dirty="0"/>
             <a:t> </a:t>
           </a:r>
           <a:r>
-            <a:rPr lang="en-US" b="1" dirty="0">
+            <a:rPr lang="en-US" sz="1400" b="1" dirty="0">
               <a:solidFill>
                 <a:srgbClr val="00B050"/>
               </a:solidFill>
             </a:rPr>
             <a:t>B</a:t>
           </a:r>
-          <a:endParaRPr lang="en-CA" b="1" dirty="0">
+          <a:endParaRPr lang="en-CA" sz="1400" b="1" dirty="0">
             <a:solidFill>
               <a:srgbClr val="00B050"/>
             </a:solidFill>
@@ -2975,7 +2978,7 @@
       </dgm:t>
     </dgm:pt>
     <dgm:pt modelId="{C2BB84B3-6B94-40E5-8A8C-88566F375E4A}">
-      <dgm:prSet phldrT="[Text]"/>
+      <dgm:prSet phldrT="[Text]" custT="1"/>
       <dgm:spPr>
         <a:ln w="38100">
           <a:solidFill>
@@ -3014,7 +3017,7 @@
             </a:spcAft>
           </a:pPr>
           <a:r>
-            <a:rPr lang="en-US" b="1" dirty="0">
+            <a:rPr lang="en-US" sz="1400" b="1" dirty="0">
               <a:solidFill>
                 <a:srgbClr val="00B0F0"/>
               </a:solidFill>
@@ -3022,15 +3025,15 @@
             <a:t>A</a:t>
           </a:r>
           <a:r>
-            <a:rPr lang="en-US" dirty="0"/>
+            <a:rPr lang="en-US" sz="1400" dirty="0"/>
             <a:t> is </a:t>
           </a:r>
           <a:r>
-            <a:rPr lang="en-US" i="1" dirty="0"/>
+            <a:rPr lang="en-US" sz="1400" i="1" dirty="0"/>
             <a:t>Disjoint</a:t>
           </a:r>
           <a:r>
-            <a:rPr lang="en-US" dirty="0"/>
+            <a:rPr lang="en-US" sz="1400" dirty="0"/>
             <a:t> </a:t>
           </a:r>
         </a:p>
@@ -3041,11 +3044,11 @@
             </a:spcAft>
           </a:pPr>
           <a:r>
-            <a:rPr lang="en-US" dirty="0"/>
+            <a:rPr lang="en-US" sz="1400" dirty="0"/>
             <a:t>with </a:t>
           </a:r>
           <a:r>
-            <a:rPr lang="en-US" b="1" dirty="0">
+            <a:rPr lang="en-US" sz="1400" b="1" dirty="0">
               <a:solidFill>
                 <a:srgbClr val="00B050"/>
               </a:solidFill>
@@ -3053,10 +3056,10 @@
             <a:t>B</a:t>
           </a:r>
           <a:r>
-            <a:rPr lang="en-US" dirty="0"/>
+            <a:rPr lang="en-US" sz="1400" dirty="0"/>
             <a:t> </a:t>
           </a:r>
-          <a:endParaRPr lang="en-CA" dirty="0"/>
+          <a:endParaRPr lang="en-CA" sz="1400" dirty="0"/>
         </a:p>
       </dgm:t>
     </dgm:pt>
@@ -3115,18 +3118,18 @@
       </dgm:t>
     </dgm:pt>
     <dgm:pt modelId="{1F9854BB-22E9-4049-9456-C1C1896FCEC5}">
-      <dgm:prSet phldrT="[Text]"/>
+      <dgm:prSet phldrT="[Text]" custT="1"/>
       <dgm:spPr/>
       <dgm:t>
         <a:bodyPr/>
         <a:lstStyle/>
         <a:p>
           <a:r>
-            <a:rPr lang="en-US" dirty="0"/>
+            <a:rPr lang="en-US" sz="1400" dirty="0"/>
             <a:t>Does the border of </a:t>
           </a:r>
           <a:r>
-            <a:rPr lang="en-US" b="1" dirty="0">
+            <a:rPr lang="en-US" sz="1400" b="1" dirty="0">
               <a:solidFill>
                 <a:srgbClr val="00B0F0"/>
               </a:solidFill>
@@ -3134,11 +3137,11 @@
             <a:t>A</a:t>
           </a:r>
           <a:r>
-            <a:rPr lang="en-US" dirty="0"/>
+            <a:rPr lang="en-US" sz="1400" dirty="0"/>
             <a:t> overlap with the border of </a:t>
           </a:r>
           <a:r>
-            <a:rPr lang="en-US" b="1" dirty="0">
+            <a:rPr lang="en-US" sz="1400" b="1" dirty="0">
               <a:solidFill>
                 <a:srgbClr val="00B050"/>
               </a:solidFill>
@@ -3146,10 +3149,10 @@
             <a:t>B</a:t>
           </a:r>
           <a:r>
-            <a:rPr lang="en-US" dirty="0"/>
+            <a:rPr lang="en-US" sz="1400" dirty="0"/>
             <a:t>? </a:t>
           </a:r>
-          <a:endParaRPr lang="en-CA" dirty="0"/>
+          <a:endParaRPr lang="en-CA" sz="1400" dirty="0"/>
         </a:p>
       </dgm:t>
     </dgm:pt>
@@ -3208,7 +3211,7 @@
       </dgm:t>
     </dgm:pt>
     <dgm:pt modelId="{611F5EBD-32D7-4C41-899A-5B09F7276570}">
-      <dgm:prSet phldrT="[Text]"/>
+      <dgm:prSet phldrT="[Text]" custT="1"/>
       <dgm:spPr>
         <a:ln w="38100">
           <a:solidFill>
@@ -3242,7 +3245,7 @@
         <a:lstStyle/>
         <a:p>
           <a:r>
-            <a:rPr lang="en-US" b="1" dirty="0">
+            <a:rPr lang="en-US" sz="1400" b="1" dirty="0">
               <a:solidFill>
                 <a:srgbClr val="00B0F0"/>
               </a:solidFill>
@@ -3250,18 +3253,18 @@
             <a:t>A</a:t>
           </a:r>
           <a:r>
-            <a:rPr lang="en-US" dirty="0"/>
+            <a:rPr lang="en-US" sz="1400" dirty="0"/>
             <a:t> Shelters </a:t>
           </a:r>
           <a:r>
-            <a:rPr lang="en-US" b="1" dirty="0">
+            <a:rPr lang="en-US" sz="1400" b="1" dirty="0">
               <a:solidFill>
                 <a:srgbClr val="00B050"/>
               </a:solidFill>
             </a:rPr>
             <a:t>B</a:t>
           </a:r>
-          <a:endParaRPr lang="en-CA" dirty="0"/>
+          <a:endParaRPr lang="en-CA" sz="1400" dirty="0"/>
         </a:p>
       </dgm:t>
     </dgm:pt>
@@ -3318,18 +3321,18 @@
       </dgm:t>
     </dgm:pt>
     <dgm:pt modelId="{BEE09A10-6C19-46C6-A747-9CF8BA45C75F}">
-      <dgm:prSet phldrT="[Text]"/>
+      <dgm:prSet phldrT="[Text]" custT="1"/>
       <dgm:spPr/>
       <dgm:t>
         <a:bodyPr/>
         <a:lstStyle/>
         <a:p>
           <a:r>
-            <a:rPr lang="en-US" dirty="0"/>
+            <a:rPr lang="en-US" sz="1400" dirty="0"/>
             <a:t>Does the convex hull of </a:t>
           </a:r>
           <a:r>
-            <a:rPr lang="en-US" b="1" dirty="0">
+            <a:rPr lang="en-US" sz="1400" b="1" dirty="0">
               <a:solidFill>
                 <a:srgbClr val="00B0F0"/>
               </a:solidFill>
@@ -3337,11 +3340,11 @@
             <a:t>A</a:t>
           </a:r>
           <a:r>
-            <a:rPr lang="en-US" dirty="0"/>
-            <a:t> contain </a:t>
-          </a:r>
-          <a:r>
-            <a:rPr lang="en-US" b="1" dirty="0">
+            <a:rPr lang="en-US" sz="1400" dirty="0"/>
+            <a:t> contain all of </a:t>
+          </a:r>
+          <a:r>
+            <a:rPr lang="en-US" sz="1400" b="1" dirty="0">
               <a:solidFill>
                 <a:srgbClr val="00B050"/>
               </a:solidFill>
@@ -3349,10 +3352,10 @@
             <a:t>B</a:t>
           </a:r>
           <a:r>
-            <a:rPr lang="en-US" dirty="0"/>
+            <a:rPr lang="en-US" sz="1400" dirty="0"/>
             <a:t>?</a:t>
           </a:r>
-          <a:endParaRPr lang="en-CA" dirty="0"/>
+          <a:endParaRPr lang="en-CA" sz="1400" dirty="0"/>
         </a:p>
       </dgm:t>
     </dgm:pt>
@@ -3411,18 +3414,18 @@
       </dgm:t>
     </dgm:pt>
     <dgm:pt modelId="{1C5200FE-FFA9-4D32-BBCD-D593EE845AF0}">
-      <dgm:prSet phldrT="[Text]"/>
+      <dgm:prSet phldrT="[Text]" custT="1"/>
       <dgm:spPr/>
       <dgm:t>
         <a:bodyPr/>
         <a:lstStyle/>
         <a:p>
           <a:r>
-            <a:rPr lang="en-US" dirty="0"/>
+            <a:rPr lang="en-US" sz="1400" dirty="0"/>
             <a:t>Does the border of </a:t>
           </a:r>
           <a:r>
-            <a:rPr lang="en-US" b="1" dirty="0">
+            <a:rPr lang="en-US" sz="1400" b="1" dirty="0">
               <a:solidFill>
                 <a:srgbClr val="00B0F0"/>
               </a:solidFill>
@@ -3430,11 +3433,11 @@
             <a:t>A</a:t>
           </a:r>
           <a:r>
-            <a:rPr lang="en-US" dirty="0"/>
+            <a:rPr lang="en-US" sz="1400" dirty="0"/>
             <a:t> overlap with the border of </a:t>
           </a:r>
           <a:r>
-            <a:rPr lang="en-US" b="1" dirty="0">
+            <a:rPr lang="en-US" sz="1400" b="1" dirty="0">
               <a:solidFill>
                 <a:srgbClr val="00B050"/>
               </a:solidFill>
@@ -3442,10 +3445,10 @@
             <a:t>B</a:t>
           </a:r>
           <a:r>
-            <a:rPr lang="en-US" dirty="0"/>
+            <a:rPr lang="en-US" sz="1400" dirty="0"/>
             <a:t>? </a:t>
           </a:r>
-          <a:endParaRPr lang="en-CA" dirty="0"/>
+          <a:endParaRPr lang="en-CA" sz="1400" dirty="0"/>
         </a:p>
       </dgm:t>
     </dgm:pt>
@@ -3502,7 +3505,7 @@
       </dgm:t>
     </dgm:pt>
     <dgm:pt modelId="{241770BA-9795-42B1-9426-B082AFE49C09}">
-      <dgm:prSet phldrT="[Text]"/>
+      <dgm:prSet phldrT="[Text]" custT="1"/>
       <dgm:spPr>
         <a:ln w="38100">
           <a:solidFill>
@@ -3536,7 +3539,7 @@
         <a:lstStyle/>
         <a:p>
           <a:r>
-            <a:rPr lang="en-US" b="1" dirty="0">
+            <a:rPr lang="en-US" sz="1400" b="1" dirty="0">
               <a:solidFill>
                 <a:srgbClr val="00B0F0"/>
               </a:solidFill>
@@ -3544,26 +3547,26 @@
             <a:t>A</a:t>
           </a:r>
           <a:r>
-            <a:rPr lang="en-US" dirty="0"/>
+            <a:rPr lang="en-US" sz="1400" dirty="0"/>
             <a:t> </a:t>
           </a:r>
           <a:r>
-            <a:rPr lang="en-CA" i="1" dirty="0"/>
+            <a:rPr lang="en-CA" sz="1400" i="1" dirty="0"/>
             <a:t>Equals</a:t>
           </a:r>
           <a:r>
-            <a:rPr lang="en-CA" dirty="0"/>
+            <a:rPr lang="en-CA" sz="1400" dirty="0"/>
             <a:t> </a:t>
           </a:r>
           <a:r>
-            <a:rPr lang="en-US" b="1" dirty="0">
+            <a:rPr lang="en-US" sz="1400" b="1" dirty="0">
               <a:solidFill>
                 <a:srgbClr val="00B050"/>
               </a:solidFill>
             </a:rPr>
             <a:t>B</a:t>
           </a:r>
-          <a:endParaRPr lang="en-CA" dirty="0"/>
+          <a:endParaRPr lang="en-CA" sz="1400" dirty="0"/>
         </a:p>
       </dgm:t>
     </dgm:pt>
@@ -3622,7 +3625,7 @@
       </dgm:t>
     </dgm:pt>
     <dgm:pt modelId="{6B2F4EBD-0588-433D-BDC9-CB90AB476E93}">
-      <dgm:prSet phldrT="[Text]"/>
+      <dgm:prSet phldrT="[Text]" custT="1"/>
       <dgm:spPr>
         <a:ln w="38100">
           <a:solidFill>
@@ -3656,7 +3659,7 @@
         <a:lstStyle/>
         <a:p>
           <a:r>
-            <a:rPr lang="en-US" b="1" dirty="0">
+            <a:rPr lang="en-US" sz="1400" b="1" dirty="0">
               <a:solidFill>
                 <a:srgbClr val="00B0F0"/>
               </a:solidFill>
@@ -3664,26 +3667,26 @@
             <a:t>A</a:t>
           </a:r>
           <a:r>
-            <a:rPr lang="en-US" dirty="0"/>
+            <a:rPr lang="en-US" sz="1400" dirty="0"/>
             <a:t> </a:t>
           </a:r>
           <a:r>
-            <a:rPr lang="en-CA" i="1" dirty="0"/>
+            <a:rPr lang="en-CA" sz="1400" i="1" dirty="0"/>
             <a:t>Partitions</a:t>
           </a:r>
           <a:r>
-            <a:rPr lang="en-CA" dirty="0"/>
+            <a:rPr lang="en-CA" sz="1400" dirty="0"/>
             <a:t> </a:t>
           </a:r>
           <a:r>
-            <a:rPr lang="en-US" b="1" dirty="0">
+            <a:rPr lang="en-US" sz="1400" b="1" dirty="0">
               <a:solidFill>
                 <a:srgbClr val="00B050"/>
               </a:solidFill>
             </a:rPr>
             <a:t>B</a:t>
           </a:r>
-          <a:endParaRPr lang="en-CA" dirty="0"/>
+          <a:endParaRPr lang="en-CA" sz="1400" dirty="0"/>
         </a:p>
       </dgm:t>
     </dgm:pt>
@@ -3756,7 +3759,7 @@
       <dgm:spPr/>
     </dgm:pt>
     <dgm:pt modelId="{60D0B9E6-82C7-4381-AE3D-A682BDCF8863}" type="pres">
-      <dgm:prSet presAssocID="{4BEC090C-1E15-4161-8659-B6B7DA165CC0}" presName="LevelOneTextNode" presStyleLbl="node0" presStyleIdx="0" presStyleCnt="1" custScaleX="36830" custScaleY="45427">
+      <dgm:prSet presAssocID="{4BEC090C-1E15-4161-8659-B6B7DA165CC0}" presName="LevelOneTextNode" presStyleLbl="node0" presStyleIdx="0" presStyleCnt="1" custScaleX="67319" custScaleY="45427" custLinFactNeighborY="2140">
         <dgm:presLayoutVars>
           <dgm:chPref val="3"/>
         </dgm:presLayoutVars>
@@ -3780,7 +3783,7 @@
       <dgm:spPr/>
     </dgm:pt>
     <dgm:pt modelId="{6C6B7D74-2E3F-42FA-BE1C-9AE309B40A28}" type="pres">
-      <dgm:prSet presAssocID="{1F9854BB-22E9-4049-9456-C1C1896FCEC5}" presName="LevelTwoTextNode" presStyleLbl="node2" presStyleIdx="0" presStyleCnt="2" custScaleX="36830" custScaleY="45427">
+      <dgm:prSet presAssocID="{1F9854BB-22E9-4049-9456-C1C1896FCEC5}" presName="LevelTwoTextNode" presStyleLbl="node2" presStyleIdx="0" presStyleCnt="2" custScaleX="67714" custScaleY="52301" custLinFactNeighborX="-1470" custLinFactNeighborY="-74634">
         <dgm:presLayoutVars>
           <dgm:chPref val="3"/>
         </dgm:presLayoutVars>
@@ -3804,7 +3807,7 @@
       <dgm:spPr/>
     </dgm:pt>
     <dgm:pt modelId="{D65DD3F9-CCB1-44FA-B8E8-39B9016DCB19}" type="pres">
-      <dgm:prSet presAssocID="{4102858B-66E2-4F4D-8103-BC8FCF77C011}" presName="LevelTwoTextNode" presStyleLbl="node3" presStyleIdx="0" presStyleCnt="4" custScaleX="36141" custScaleY="50771">
+      <dgm:prSet presAssocID="{4102858B-66E2-4F4D-8103-BC8FCF77C011}" presName="LevelTwoTextNode" presStyleLbl="node3" presStyleIdx="0" presStyleCnt="4" custScaleX="67714" custScaleY="50771" custLinFactNeighborX="-3608" custLinFactNeighborY="-98973">
         <dgm:presLayoutVars>
           <dgm:chPref val="3"/>
         </dgm:presLayoutVars>
@@ -3828,7 +3831,7 @@
       <dgm:spPr/>
     </dgm:pt>
     <dgm:pt modelId="{5ADC1B57-59CD-4290-8D3C-1F2B4B01AB44}" type="pres">
-      <dgm:prSet presAssocID="{BEE09A10-6C19-46C6-A747-9CF8BA45C75F}" presName="LevelTwoTextNode" presStyleLbl="node4" presStyleIdx="0" presStyleCnt="10" custScaleX="33053" custScaleY="50474">
+      <dgm:prSet presAssocID="{BEE09A10-6C19-46C6-A747-9CF8BA45C75F}" presName="LevelTwoTextNode" presStyleLbl="node4" presStyleIdx="0" presStyleCnt="10" custScaleX="67714" custScaleY="50474" custLinFactY="-15851" custLinFactNeighborX="-3175" custLinFactNeighborY="-100000">
         <dgm:presLayoutVars>
           <dgm:chPref val="3"/>
         </dgm:presLayoutVars>
@@ -3852,7 +3855,7 @@
       <dgm:spPr/>
     </dgm:pt>
     <dgm:pt modelId="{267ED168-A2AD-42CE-8538-059248ABFC23}" type="pres">
-      <dgm:prSet presAssocID="{C2BB84B3-6B94-40E5-8A8C-88566F375E4A}" presName="LevelTwoTextNode" presStyleLbl="node4" presStyleIdx="1" presStyleCnt="10" custScaleX="32506" custScaleY="24749">
+      <dgm:prSet presAssocID="{C2BB84B3-6B94-40E5-8A8C-88566F375E4A}" presName="LevelTwoTextNode" presStyleLbl="node4" presStyleIdx="1" presStyleCnt="10" custScaleX="67714" custScaleY="39615" custLinFactY="-36337" custLinFactNeighborX="-3345" custLinFactNeighborY="-100000">
         <dgm:presLayoutVars>
           <dgm:chPref val="3"/>
         </dgm:presLayoutVars>
@@ -3876,7 +3879,7 @@
       <dgm:spPr/>
     </dgm:pt>
     <dgm:pt modelId="{DE55BEF5-93B4-4A69-A6D6-1C09C42D422D}" type="pres">
-      <dgm:prSet presAssocID="{611F5EBD-32D7-4C41-899A-5B09F7276570}" presName="LevelTwoTextNode" presStyleLbl="node4" presStyleIdx="2" presStyleCnt="10" custScaleX="32506" custScaleY="15231">
+      <dgm:prSet presAssocID="{611F5EBD-32D7-4C41-899A-5B09F7276570}" presName="LevelTwoTextNode" presStyleLbl="node4" presStyleIdx="2" presStyleCnt="10" custScaleX="67714" custScaleY="22497" custLinFactY="-7532" custLinFactNeighborX="-2555" custLinFactNeighborY="-100000">
         <dgm:presLayoutVars>
           <dgm:chPref val="3"/>
         </dgm:presLayoutVars>
@@ -3900,7 +3903,7 @@
       <dgm:spPr/>
     </dgm:pt>
     <dgm:pt modelId="{EFD08717-F61D-4FA3-AEAA-43BEC3867CFC}" type="pres">
-      <dgm:prSet presAssocID="{76F6ED56-039E-4362-929F-14CA94C44354}" presName="LevelTwoTextNode" presStyleLbl="node4" presStyleIdx="3" presStyleCnt="10" custScaleX="33001" custScaleY="15231">
+      <dgm:prSet presAssocID="{76F6ED56-039E-4362-929F-14CA94C44354}" presName="LevelTwoTextNode" presStyleLbl="node4" presStyleIdx="3" presStyleCnt="10" custScaleX="67714" custScaleY="22497" custLinFactNeighborX="-3297" custLinFactNeighborY="-83427">
         <dgm:presLayoutVars>
           <dgm:chPref val="3"/>
         </dgm:presLayoutVars>
@@ -3924,7 +3927,7 @@
       <dgm:spPr/>
     </dgm:pt>
     <dgm:pt modelId="{C33B4FFC-EE71-4E57-B768-C2BD25E243E8}" type="pres">
-      <dgm:prSet presAssocID="{7A3D1130-4F69-4E59-9ACC-5B640EBD6EFF}" presName="LevelTwoTextNode" presStyleLbl="node3" presStyleIdx="1" presStyleCnt="4" custScaleX="36141" custScaleY="50771">
+      <dgm:prSet presAssocID="{7A3D1130-4F69-4E59-9ACC-5B640EBD6EFF}" presName="LevelTwoTextNode" presStyleLbl="node3" presStyleIdx="1" presStyleCnt="4" custScaleX="67714" custScaleY="50771" custLinFactNeighborX="822" custLinFactNeighborY="-22522">
         <dgm:presLayoutVars>
           <dgm:chPref val="3"/>
         </dgm:presLayoutVars>
@@ -3948,7 +3951,7 @@
       <dgm:spPr/>
     </dgm:pt>
     <dgm:pt modelId="{8557AC88-9D33-43F5-B999-D618E2615BC6}" type="pres">
-      <dgm:prSet presAssocID="{181C735C-A399-4DA3-8589-B01A149985B6}" presName="LevelTwoTextNode" presStyleLbl="node4" presStyleIdx="4" presStyleCnt="10" custScaleX="33001" custScaleY="15231">
+      <dgm:prSet presAssocID="{181C735C-A399-4DA3-8589-B01A149985B6}" presName="LevelTwoTextNode" presStyleLbl="node4" presStyleIdx="4" presStyleCnt="10" custScaleX="67714" custScaleY="22497" custLinFactNeighborX="-4032" custLinFactNeighborY="-38812">
         <dgm:presLayoutVars>
           <dgm:chPref val="3"/>
         </dgm:presLayoutVars>
@@ -3972,7 +3975,7 @@
       <dgm:spPr/>
     </dgm:pt>
     <dgm:pt modelId="{2F8B85E9-6CF6-4115-A357-ABFC584D494E}" type="pres">
-      <dgm:prSet presAssocID="{77B43507-91C0-4172-8210-B7BD86829BA3}" presName="LevelTwoTextNode" presStyleLbl="node4" presStyleIdx="5" presStyleCnt="10" custScaleX="33001" custScaleY="15231">
+      <dgm:prSet presAssocID="{77B43507-91C0-4172-8210-B7BD86829BA3}" presName="LevelTwoTextNode" presStyleLbl="node4" presStyleIdx="5" presStyleCnt="10" custScaleX="67714" custScaleY="22497" custLinFactNeighborX="-3632" custLinFactNeighborY="6462">
         <dgm:presLayoutVars>
           <dgm:chPref val="3"/>
         </dgm:presLayoutVars>
@@ -3996,7 +3999,7 @@
       <dgm:spPr/>
     </dgm:pt>
     <dgm:pt modelId="{3FBAFE53-594D-4D03-B138-006A0BB47A9C}" type="pres">
-      <dgm:prSet presAssocID="{0B8F6A2C-499F-4D42-90C6-D5D0C08F7746}" presName="LevelTwoTextNode" presStyleLbl="node2" presStyleIdx="1" presStyleCnt="2" custScaleX="36830" custScaleY="45427">
+      <dgm:prSet presAssocID="{0B8F6A2C-499F-4D42-90C6-D5D0C08F7746}" presName="LevelTwoTextNode" presStyleLbl="node2" presStyleIdx="1" presStyleCnt="2" custScaleX="67714" custScaleY="51518" custLinFactY="1230" custLinFactNeighborX="-1739" custLinFactNeighborY="100000">
         <dgm:presLayoutVars>
           <dgm:chPref val="3"/>
         </dgm:presLayoutVars>
@@ -4020,7 +4023,7 @@
       <dgm:spPr/>
     </dgm:pt>
     <dgm:pt modelId="{752E73D5-6F0C-4299-B028-43DCAE9EBF12}" type="pres">
-      <dgm:prSet presAssocID="{1C5200FE-FFA9-4D32-BBCD-D593EE845AF0}" presName="LevelTwoTextNode" presStyleLbl="node3" presStyleIdx="2" presStyleCnt="4" custScaleX="36141" custScaleY="50771">
+      <dgm:prSet presAssocID="{1C5200FE-FFA9-4D32-BBCD-D593EE845AF0}" presName="LevelTwoTextNode" presStyleLbl="node3" presStyleIdx="2" presStyleCnt="4" custScaleX="67714" custScaleY="50771" custLinFactNeighborX="-3631" custLinFactNeighborY="73124">
         <dgm:presLayoutVars>
           <dgm:chPref val="3"/>
         </dgm:presLayoutVars>
@@ -4044,7 +4047,7 @@
       <dgm:spPr/>
     </dgm:pt>
     <dgm:pt modelId="{F37F940C-FB29-4D0E-B70D-83659D265A1E}" type="pres">
-      <dgm:prSet presAssocID="{A0B9EC76-736B-41EF-A0BF-FF6D2F0BB0BB}" presName="LevelTwoTextNode" presStyleLbl="node4" presStyleIdx="6" presStyleCnt="10" custScaleX="33001" custScaleY="15231">
+      <dgm:prSet presAssocID="{A0B9EC76-736B-41EF-A0BF-FF6D2F0BB0BB}" presName="LevelTwoTextNode" presStyleLbl="node4" presStyleIdx="6" presStyleCnt="10" custScaleX="67714" custScaleY="22497" custLinFactNeighborX="-3664" custLinFactNeighborY="48075">
         <dgm:presLayoutVars>
           <dgm:chPref val="3"/>
         </dgm:presLayoutVars>
@@ -4068,7 +4071,7 @@
       <dgm:spPr/>
     </dgm:pt>
     <dgm:pt modelId="{24F6AB9A-C44D-402F-B1AF-B011B11524E7}" type="pres">
-      <dgm:prSet presAssocID="{A41D72E9-2C78-48B5-BD7D-C1381877FD7E}" presName="LevelTwoTextNode" presStyleLbl="node4" presStyleIdx="7" presStyleCnt="10" custScaleX="33001" custScaleY="50771">
+      <dgm:prSet presAssocID="{A41D72E9-2C78-48B5-BD7D-C1381877FD7E}" presName="LevelTwoTextNode" presStyleLbl="node4" presStyleIdx="7" presStyleCnt="10" custScaleX="67714" custScaleY="50771" custLinFactY="12361" custLinFactNeighborX="-1080" custLinFactNeighborY="100000">
         <dgm:presLayoutVars>
           <dgm:chPref val="3"/>
         </dgm:presLayoutVars>
@@ -4092,7 +4095,7 @@
       <dgm:spPr/>
     </dgm:pt>
     <dgm:pt modelId="{778776B0-6F5E-4A58-93D8-59BB3630F525}" type="pres">
-      <dgm:prSet presAssocID="{241770BA-9795-42B1-9426-B082AFE49C09}" presName="LevelTwoTextNode" presStyleLbl="node4" presStyleIdx="8" presStyleCnt="10" custScaleX="32506" custScaleY="15231">
+      <dgm:prSet presAssocID="{241770BA-9795-42B1-9426-B082AFE49C09}" presName="LevelTwoTextNode" presStyleLbl="node4" presStyleIdx="8" presStyleCnt="10" custScaleX="67714" custScaleY="22497" custLinFactNeighborX="-2413" custLinFactNeighborY="68722">
         <dgm:presLayoutVars>
           <dgm:chPref val="3"/>
         </dgm:presLayoutVars>
@@ -4116,7 +4119,7 @@
       <dgm:spPr/>
     </dgm:pt>
     <dgm:pt modelId="{D0953BFD-A9E5-445A-879D-994B68DDBF16}" type="pres">
-      <dgm:prSet presAssocID="{6B2F4EBD-0588-433D-BDC9-CB90AB476E93}" presName="LevelTwoTextNode" presStyleLbl="node4" presStyleIdx="9" presStyleCnt="10" custScaleX="32506" custScaleY="15231" custLinFactNeighborX="126" custLinFactNeighborY="8793">
+      <dgm:prSet presAssocID="{6B2F4EBD-0588-433D-BDC9-CB90AB476E93}" presName="LevelTwoTextNode" presStyleLbl="node4" presStyleIdx="9" presStyleCnt="10" custScaleX="67714" custScaleY="22497" custLinFactY="44414" custLinFactNeighborX="-1768" custLinFactNeighborY="100000">
         <dgm:presLayoutVars>
           <dgm:chPref val="3"/>
         </dgm:presLayoutVars>
@@ -4140,7 +4143,7 @@
       <dgm:spPr/>
     </dgm:pt>
     <dgm:pt modelId="{C0A2D960-AF5A-445D-AE5F-800B8AC365D3}" type="pres">
-      <dgm:prSet presAssocID="{661FE512-40D7-433D-9F16-55C6C728AAEA}" presName="LevelTwoTextNode" presStyleLbl="node3" presStyleIdx="3" presStyleCnt="4" custScaleX="36141" custScaleY="15231">
+      <dgm:prSet presAssocID="{661FE512-40D7-433D-9F16-55C6C728AAEA}" presName="LevelTwoTextNode" presStyleLbl="node3" presStyleIdx="3" presStyleCnt="4" custScaleX="67714" custScaleY="22497" custLinFactY="14173" custLinFactNeighborX="-4449" custLinFactNeighborY="100000">
         <dgm:presLayoutVars>
           <dgm:chPref val="3"/>
         </dgm:presLayoutVars>
@@ -4310,7 +4313,7 @@
   <dgm:whole/>
   <dgm:extLst>
     <a:ext uri="http://schemas.microsoft.com/office/drawing/2008/diagram">
-      <dsp:dataModelExt xmlns:dsp="http://schemas.microsoft.com/office/drawing/2008/diagram" relId="rId6" minVer="http://schemas.openxmlformats.org/drawingml/2006/diagram"/>
+      <dsp:dataModelExt xmlns:dsp="http://schemas.microsoft.com/office/drawing/2008/diagram" relId="rId7" minVer="http://schemas.openxmlformats.org/drawingml/2006/diagram"/>
     </a:ext>
   </dgm:extLst>
 </dgm:dataModel>
@@ -6024,8 +6027,8 @@
       </dsp:nvSpPr>
       <dsp:spPr>
         <a:xfrm>
-          <a:off x="5343" y="3390224"/>
-          <a:ext cx="1334432" cy="822960"/>
+          <a:off x="6090" y="3527302"/>
+          <a:ext cx="1641755" cy="553929"/>
         </a:xfrm>
         <a:prstGeom prst="roundRect">
           <a:avLst>
@@ -6070,12 +6073,12 @@
         </a:fontRef>
       </dsp:style>
       <dsp:txBody>
-        <a:bodyPr spcFirstLastPara="0" vert="horz" wrap="square" lIns="8255" tIns="8255" rIns="8255" bIns="8255" numCol="1" spcCol="1270" anchor="ctr" anchorCtr="0">
+        <a:bodyPr spcFirstLastPara="0" vert="horz" wrap="square" lIns="8890" tIns="8890" rIns="8890" bIns="8890" numCol="1" spcCol="1270" anchor="ctr" anchorCtr="0">
           <a:noAutofit/>
         </a:bodyPr>
         <a:lstStyle/>
         <a:p>
-          <a:pPr marL="0" lvl="0" indent="0" algn="ctr" defTabSz="577850">
+          <a:pPr marL="0" lvl="0" indent="0" algn="ctr" defTabSz="622300">
             <a:lnSpc>
               <a:spcPct val="90000"/>
             </a:lnSpc>
@@ -6088,11 +6091,11 @@
             <a:buNone/>
           </a:pPr>
           <a:r>
-            <a:rPr lang="en-US" sz="1300" kern="1200" dirty="0"/>
+            <a:rPr lang="en-US" sz="1400" kern="1200" dirty="0"/>
             <a:t>Do the interiors of </a:t>
           </a:r>
           <a:r>
-            <a:rPr lang="en-US" sz="1300" b="1" kern="1200" dirty="0">
+            <a:rPr lang="en-US" sz="1400" b="1" kern="1200" dirty="0">
               <a:solidFill>
                 <a:srgbClr val="00B0F0"/>
               </a:solidFill>
@@ -6100,11 +6103,11 @@
             <a:t>A</a:t>
           </a:r>
           <a:r>
-            <a:rPr lang="en-US" sz="1300" kern="1200" dirty="0"/>
+            <a:rPr lang="en-US" sz="1400" kern="1200" dirty="0"/>
             <a:t> and </a:t>
           </a:r>
           <a:r>
-            <a:rPr lang="en-US" sz="1300" b="1" kern="1200" dirty="0">
+            <a:rPr lang="en-US" sz="1400" b="1" kern="1200" dirty="0">
               <a:solidFill>
                 <a:srgbClr val="00B050"/>
               </a:solidFill>
@@ -6112,14 +6115,14 @@
             <a:t>B </a:t>
           </a:r>
           <a:r>
-            <a:rPr lang="en-US" sz="1300" kern="1200" dirty="0"/>
+            <a:rPr lang="en-US" sz="1400" kern="1200" dirty="0"/>
             <a:t>overlap?</a:t>
           </a:r>
         </a:p>
       </dsp:txBody>
       <dsp:txXfrm>
-        <a:off x="29447" y="3414328"/>
-        <a:ext cx="1286224" cy="774752"/>
+        <a:off x="22314" y="3543526"/>
+        <a:ext cx="1609307" cy="521481"/>
       </dsp:txXfrm>
     </dsp:sp>
     <dsp:sp modelId="{90D847B5-D5A0-4244-846E-8ADF8BABDEED}">
@@ -6128,9 +6131,9 @@
         <dsp:cNvSpPr/>
       </dsp:nvSpPr>
       <dsp:spPr>
-        <a:xfrm rot="19190091">
-          <a:off x="1116166" y="3166313"/>
-          <a:ext cx="1896506" cy="47548"/>
+        <a:xfrm rot="17806091">
+          <a:off x="1074495" y="2856876"/>
+          <a:ext cx="2086358" cy="32004"/>
         </a:xfrm>
         <a:custGeom>
           <a:avLst/>
@@ -6141,18 +6144,18 @@
           <a:pathLst>
             <a:path>
               <a:moveTo>
-                <a:pt x="0" y="23774"/>
+                <a:pt x="0" y="16002"/>
               </a:moveTo>
               <a:lnTo>
-                <a:pt x="811941" y="23774"/>
+                <a:pt x="893222" y="16002"/>
               </a:lnTo>
             </a:path>
             <a:path>
               <a:moveTo>
-                <a:pt x="1084564" y="23774"/>
+                <a:pt x="1193136" y="16002"/>
               </a:moveTo>
               <a:lnTo>
-                <a:pt x="1896506" y="23774"/>
+                <a:pt x="2086358" y="16002"/>
               </a:lnTo>
             </a:path>
           </a:pathLst>
@@ -6220,8 +6223,8 @@
         </a:p>
       </dsp:txBody>
       <dsp:txXfrm>
-        <a:off x="1928108" y="2988584"/>
-        <a:ext cx="272622" cy="403007"/>
+        <a:off x="1967717" y="2670763"/>
+        <a:ext cx="299914" cy="404231"/>
       </dsp:txXfrm>
     </dsp:sp>
     <dsp:sp modelId="{6C6B7D74-2E3F-42FA-BE1C-9AE309B40A28}">
@@ -6231,8 +6234,8 @@
       </dsp:nvSpPr>
       <dsp:spPr>
         <a:xfrm>
-          <a:off x="2789063" y="2166991"/>
-          <a:ext cx="1334432" cy="822960"/>
+          <a:off x="2587503" y="1622615"/>
+          <a:ext cx="1651388" cy="637750"/>
         </a:xfrm>
         <a:prstGeom prst="roundRect">
           <a:avLst>
@@ -6277,12 +6280,12 @@
         </a:fontRef>
       </dsp:style>
       <dsp:txBody>
-        <a:bodyPr spcFirstLastPara="0" vert="horz" wrap="square" lIns="8255" tIns="8255" rIns="8255" bIns="8255" numCol="1" spcCol="1270" anchor="ctr" anchorCtr="0">
+        <a:bodyPr spcFirstLastPara="0" vert="horz" wrap="square" lIns="8890" tIns="8890" rIns="8890" bIns="8890" numCol="1" spcCol="1270" anchor="ctr" anchorCtr="0">
           <a:noAutofit/>
         </a:bodyPr>
         <a:lstStyle/>
         <a:p>
-          <a:pPr marL="0" lvl="0" indent="0" algn="ctr" defTabSz="577850">
+          <a:pPr marL="0" lvl="0" indent="0" algn="ctr" defTabSz="622300">
             <a:lnSpc>
               <a:spcPct val="90000"/>
             </a:lnSpc>
@@ -6295,11 +6298,11 @@
             <a:buNone/>
           </a:pPr>
           <a:r>
-            <a:rPr lang="en-US" sz="1300" kern="1200" dirty="0"/>
+            <a:rPr lang="en-US" sz="1400" kern="1200" dirty="0"/>
             <a:t>Does the border of </a:t>
           </a:r>
           <a:r>
-            <a:rPr lang="en-US" sz="1300" b="1" kern="1200" dirty="0">
+            <a:rPr lang="en-US" sz="1400" b="1" kern="1200" dirty="0">
               <a:solidFill>
                 <a:srgbClr val="00B0F0"/>
               </a:solidFill>
@@ -6307,11 +6310,11 @@
             <a:t>A</a:t>
           </a:r>
           <a:r>
-            <a:rPr lang="en-US" sz="1300" kern="1200" dirty="0"/>
+            <a:rPr lang="en-US" sz="1400" kern="1200" dirty="0"/>
             <a:t> overlap with the border of </a:t>
           </a:r>
           <a:r>
-            <a:rPr lang="en-US" sz="1300" b="1" kern="1200" dirty="0">
+            <a:rPr lang="en-US" sz="1400" b="1" kern="1200" dirty="0">
               <a:solidFill>
                 <a:srgbClr val="00B050"/>
               </a:solidFill>
@@ -6319,15 +6322,15 @@
             <a:t>B</a:t>
           </a:r>
           <a:r>
-            <a:rPr lang="en-US" sz="1300" kern="1200" dirty="0"/>
+            <a:rPr lang="en-US" sz="1400" kern="1200" dirty="0"/>
             <a:t>? </a:t>
           </a:r>
-          <a:endParaRPr lang="en-CA" sz="1300" kern="1200" dirty="0"/>
+          <a:endParaRPr lang="en-CA" sz="1400" kern="1200" dirty="0"/>
         </a:p>
       </dsp:txBody>
       <dsp:txXfrm>
-        <a:off x="2813167" y="2191095"/>
-        <a:ext cx="1286224" cy="774752"/>
+        <a:off x="2606182" y="1641294"/>
+        <a:ext cx="1614030" cy="600392"/>
       </dsp:txXfrm>
     </dsp:sp>
     <dsp:sp modelId="{FC40F70A-F5C9-433A-A55D-123A5B28E785}">
@@ -6336,9 +6339,9 @@
         <dsp:cNvSpPr/>
       </dsp:nvSpPr>
       <dsp:spPr>
-        <a:xfrm rot="20039197">
-          <a:off x="4041807" y="2201054"/>
-          <a:ext cx="1612664" cy="47548"/>
+        <a:xfrm rot="19063821">
+          <a:off x="4076667" y="1505835"/>
+          <a:ext cx="1247814" cy="32004"/>
         </a:xfrm>
         <a:custGeom>
           <a:avLst/>
@@ -6349,18 +6352,18 @@
           <a:pathLst>
             <a:path>
               <a:moveTo>
-                <a:pt x="0" y="23774"/>
+                <a:pt x="0" y="16002"/>
               </a:moveTo>
               <a:lnTo>
-                <a:pt x="671523" y="23774"/>
+                <a:pt x="490351" y="16002"/>
               </a:lnTo>
             </a:path>
             <a:path>
               <a:moveTo>
-                <a:pt x="941141" y="23774"/>
+                <a:pt x="757462" y="16002"/>
               </a:moveTo>
               <a:lnTo>
-                <a:pt x="1612664" y="23774"/>
+                <a:pt x="1247814" y="16002"/>
               </a:lnTo>
             </a:path>
           </a:pathLst>
@@ -6428,8 +6431,8 @@
         </a:p>
       </dsp:txBody>
       <dsp:txXfrm>
-        <a:off x="4713331" y="2028285"/>
-        <a:ext cx="269617" cy="393087"/>
+        <a:off x="4567019" y="1365861"/>
+        <a:ext cx="267110" cy="311953"/>
       </dsp:txXfrm>
     </dsp:sp>
     <dsp:sp modelId="{D65DD3F9-CCB1-44FA-B8E8-39B9016DCB19}">
@@ -6439,8 +6442,8 @@
       </dsp:nvSpPr>
       <dsp:spPr>
         <a:xfrm>
-          <a:off x="5572784" y="1411300"/>
-          <a:ext cx="1309468" cy="919772"/>
+          <a:off x="5162258" y="792638"/>
+          <a:ext cx="1651388" cy="619093"/>
         </a:xfrm>
         <a:prstGeom prst="roundRect">
           <a:avLst>
@@ -6485,12 +6488,12 @@
         </a:fontRef>
       </dsp:style>
       <dsp:txBody>
-        <a:bodyPr spcFirstLastPara="0" vert="horz" wrap="square" lIns="8255" tIns="8255" rIns="8255" bIns="8255" numCol="1" spcCol="1270" anchor="ctr" anchorCtr="0">
+        <a:bodyPr spcFirstLastPara="0" vert="horz" wrap="square" lIns="8890" tIns="8890" rIns="8890" bIns="8890" numCol="1" spcCol="1270" anchor="ctr" anchorCtr="0">
           <a:noAutofit/>
         </a:bodyPr>
         <a:lstStyle/>
         <a:p>
-          <a:pPr marL="0" lvl="0" indent="0" algn="ctr" defTabSz="577850">
+          <a:pPr marL="0" lvl="0" indent="0" algn="ctr" defTabSz="622300">
             <a:lnSpc>
               <a:spcPct val="90000"/>
             </a:lnSpc>
@@ -6503,15 +6506,15 @@
             <a:buNone/>
           </a:pPr>
           <a:r>
-            <a:rPr lang="en-CA" sz="1300" kern="1200" dirty="0"/>
+            <a:rPr lang="en-CA" sz="1400" kern="1200" dirty="0"/>
             <a:t>Does the external boundary </a:t>
           </a:r>
           <a:r>
-            <a:rPr lang="en-US" sz="1300" kern="1200" dirty="0"/>
+            <a:rPr lang="en-US" sz="1400" kern="1200" dirty="0"/>
             <a:t>of </a:t>
           </a:r>
           <a:r>
-            <a:rPr lang="en-US" sz="1300" b="1" kern="1200" dirty="0">
+            <a:rPr lang="en-US" sz="1400" b="1" kern="1200" dirty="0">
               <a:solidFill>
                 <a:srgbClr val="00B0F0"/>
               </a:solidFill>
@@ -6519,11 +6522,11 @@
             <a:t>A </a:t>
           </a:r>
           <a:r>
-            <a:rPr lang="en-US" sz="1300" kern="1200" dirty="0"/>
-            <a:t>encompass </a:t>
-          </a:r>
-          <a:r>
-            <a:rPr lang="en-US" sz="1300" b="1" kern="1200" dirty="0">
+            <a:rPr lang="en-US" sz="1400" kern="1200" dirty="0"/>
+            <a:t>encompass all of </a:t>
+          </a:r>
+          <a:r>
+            <a:rPr lang="en-US" sz="1400" b="1" kern="1200" dirty="0">
               <a:solidFill>
                 <a:srgbClr val="00B050"/>
               </a:solidFill>
@@ -6531,15 +6534,15 @@
             <a:t>B</a:t>
           </a:r>
           <a:r>
-            <a:rPr lang="en-US" sz="1300" kern="1200" dirty="0"/>
+            <a:rPr lang="en-US" sz="1400" kern="1200" dirty="0"/>
             <a:t>?</a:t>
           </a:r>
-          <a:endParaRPr lang="en-CA" sz="1300" kern="1200" dirty="0"/>
+          <a:endParaRPr lang="en-CA" sz="1400" kern="1200" dirty="0"/>
         </a:p>
       </dsp:txBody>
       <dsp:txXfrm>
-        <a:off x="5599723" y="1438239"/>
-        <a:ext cx="1255590" cy="865894"/>
+        <a:off x="5180391" y="810771"/>
+        <a:ext cx="1615122" cy="582827"/>
       </dsp:txXfrm>
     </dsp:sp>
     <dsp:sp modelId="{E9013B9B-0814-4824-B7A5-76BC1EEA3FFD}">
@@ -6548,9 +6551,9 @@
         <dsp:cNvSpPr/>
       </dsp:nvSpPr>
       <dsp:spPr>
-        <a:xfrm rot="20958027">
-          <a:off x="6869431" y="1710495"/>
-          <a:ext cx="1474931" cy="47548"/>
+        <a:xfrm rot="20173412">
+          <a:off x="6767919" y="868970"/>
+          <a:ext cx="1077521" cy="32004"/>
         </a:xfrm>
         <a:custGeom>
           <a:avLst/>
@@ -6561,18 +6564,18 @@
           <a:pathLst>
             <a:path>
               <a:moveTo>
-                <a:pt x="0" y="23774"/>
+                <a:pt x="0" y="16002"/>
               </a:moveTo>
               <a:lnTo>
-                <a:pt x="596886" y="23774"/>
+                <a:pt x="398178" y="16002"/>
               </a:lnTo>
             </a:path>
             <a:path>
               <a:moveTo>
-                <a:pt x="878044" y="23774"/>
+                <a:pt x="679343" y="16002"/>
               </a:moveTo>
               <a:lnTo>
-                <a:pt x="1474931" y="23774"/>
+                <a:pt x="1077521" y="16002"/>
               </a:lnTo>
             </a:path>
           </a:pathLst>
@@ -6640,8 +6643,8 @@
         </a:p>
       </dsp:txBody>
       <dsp:txXfrm>
-        <a:off x="7466317" y="1549903"/>
-        <a:ext cx="281158" cy="368732"/>
+        <a:off x="7166097" y="750283"/>
+        <a:ext cx="281165" cy="269380"/>
       </dsp:txXfrm>
     </dsp:sp>
     <dsp:sp modelId="{5ADC1B57-59CD-4290-8D3C-1F2B4B01AB44}">
@@ -6651,8 +6654,8 @@
       </dsp:nvSpPr>
       <dsp:spPr>
         <a:xfrm>
-          <a:off x="8331540" y="1140157"/>
-          <a:ext cx="1197583" cy="914392"/>
+          <a:off x="7799714" y="360025"/>
+          <a:ext cx="1651388" cy="615472"/>
         </a:xfrm>
         <a:prstGeom prst="roundRect">
           <a:avLst>
@@ -6697,12 +6700,12 @@
         </a:fontRef>
       </dsp:style>
       <dsp:txBody>
-        <a:bodyPr spcFirstLastPara="0" vert="horz" wrap="square" lIns="8255" tIns="8255" rIns="8255" bIns="8255" numCol="1" spcCol="1270" anchor="ctr" anchorCtr="0">
+        <a:bodyPr spcFirstLastPara="0" vert="horz" wrap="square" lIns="8890" tIns="8890" rIns="8890" bIns="8890" numCol="1" spcCol="1270" anchor="ctr" anchorCtr="0">
           <a:noAutofit/>
         </a:bodyPr>
         <a:lstStyle/>
         <a:p>
-          <a:pPr marL="0" lvl="0" indent="0" algn="ctr" defTabSz="577850">
+          <a:pPr marL="0" lvl="0" indent="0" algn="ctr" defTabSz="622300">
             <a:lnSpc>
               <a:spcPct val="90000"/>
             </a:lnSpc>
@@ -6715,11 +6718,11 @@
             <a:buNone/>
           </a:pPr>
           <a:r>
-            <a:rPr lang="en-US" sz="1300" kern="1200" dirty="0"/>
+            <a:rPr lang="en-US" sz="1400" kern="1200" dirty="0"/>
             <a:t>Does the convex hull of </a:t>
           </a:r>
           <a:r>
-            <a:rPr lang="en-US" sz="1300" b="1" kern="1200" dirty="0">
+            <a:rPr lang="en-US" sz="1400" b="1" kern="1200" dirty="0">
               <a:solidFill>
                 <a:srgbClr val="00B0F0"/>
               </a:solidFill>
@@ -6727,11 +6730,11 @@
             <a:t>A</a:t>
           </a:r>
           <a:r>
-            <a:rPr lang="en-US" sz="1300" kern="1200" dirty="0"/>
-            <a:t> contain </a:t>
-          </a:r>
-          <a:r>
-            <a:rPr lang="en-US" sz="1300" b="1" kern="1200" dirty="0">
+            <a:rPr lang="en-US" sz="1400" kern="1200" dirty="0"/>
+            <a:t> contain all of </a:t>
+          </a:r>
+          <a:r>
+            <a:rPr lang="en-US" sz="1400" b="1" kern="1200" dirty="0">
               <a:solidFill>
                 <a:srgbClr val="00B050"/>
               </a:solidFill>
@@ -6739,15 +6742,15 @@
             <a:t>B</a:t>
           </a:r>
           <a:r>
-            <a:rPr lang="en-US" sz="1300" kern="1200" dirty="0"/>
+            <a:rPr lang="en-US" sz="1400" kern="1200" dirty="0"/>
             <a:t>?</a:t>
           </a:r>
-          <a:endParaRPr lang="en-CA" sz="1300" kern="1200" dirty="0"/>
+          <a:endParaRPr lang="en-CA" sz="1400" kern="1200" dirty="0"/>
         </a:p>
       </dsp:txBody>
       <dsp:txXfrm>
-        <a:off x="8358322" y="1166939"/>
-        <a:ext cx="1144019" cy="860828"/>
+        <a:off x="7817741" y="378052"/>
+        <a:ext cx="1615334" cy="579418"/>
       </dsp:txXfrm>
     </dsp:sp>
     <dsp:sp modelId="{2AD3D3E2-C6AC-405A-9A8A-D0423B528F9D}">
@@ -6756,9 +6759,9 @@
         <dsp:cNvSpPr/>
       </dsp:nvSpPr>
       <dsp:spPr>
-        <a:xfrm rot="20958027">
-          <a:off x="9516302" y="1436661"/>
-          <a:ext cx="1474931" cy="47548"/>
+        <a:xfrm rot="20178494">
+          <a:off x="9406402" y="438643"/>
+          <a:ext cx="1060762" cy="32004"/>
         </a:xfrm>
         <a:custGeom>
           <a:avLst/>
@@ -6769,18 +6772,18 @@
           <a:pathLst>
             <a:path>
               <a:moveTo>
-                <a:pt x="0" y="23774"/>
+                <a:pt x="0" y="16002"/>
               </a:moveTo>
               <a:lnTo>
-                <a:pt x="596886" y="23774"/>
+                <a:pt x="391984" y="16002"/>
               </a:lnTo>
             </a:path>
             <a:path>
               <a:moveTo>
-                <a:pt x="878044" y="23774"/>
+                <a:pt x="668777" y="16002"/>
               </a:moveTo>
               <a:lnTo>
-                <a:pt x="1474931" y="23774"/>
+                <a:pt x="1060762" y="16002"/>
               </a:lnTo>
             </a:path>
           </a:pathLst>
@@ -6848,8 +6851,8 @@
         </a:p>
       </dsp:txBody>
       <dsp:txXfrm>
-        <a:off x="10113188" y="1276069"/>
-        <a:ext cx="281158" cy="368732"/>
+        <a:off x="9798387" y="322050"/>
+        <a:ext cx="276792" cy="265190"/>
       </dsp:txXfrm>
     </dsp:sp>
     <dsp:sp modelId="{267ED168-A2AD-42CE-8538-059248ABFC23}">
@@ -6859,8 +6862,8 @@
       </dsp:nvSpPr>
       <dsp:spPr>
         <a:xfrm>
-          <a:off x="10978412" y="1099341"/>
-          <a:ext cx="1177764" cy="448355"/>
+          <a:off x="10422464" y="0"/>
+          <a:ext cx="1651388" cy="483059"/>
         </a:xfrm>
         <a:prstGeom prst="roundRect">
           <a:avLst>
@@ -6919,12 +6922,12 @@
         </a:fontRef>
       </dsp:style>
       <dsp:txBody>
-        <a:bodyPr spcFirstLastPara="0" vert="horz" wrap="square" lIns="8255" tIns="8255" rIns="8255" bIns="8255" numCol="1" spcCol="1270" anchor="ctr" anchorCtr="0">
+        <a:bodyPr spcFirstLastPara="0" vert="horz" wrap="square" lIns="8890" tIns="8890" rIns="8890" bIns="8890" numCol="1" spcCol="1270" anchor="ctr" anchorCtr="0">
           <a:noAutofit/>
         </a:bodyPr>
         <a:lstStyle/>
         <a:p>
-          <a:pPr marL="0" lvl="0" indent="0" algn="ctr" defTabSz="577850">
+          <a:pPr marL="0" lvl="0" indent="0" algn="ctr" defTabSz="622300">
             <a:lnSpc>
               <a:spcPct val="90000"/>
             </a:lnSpc>
@@ -6937,7 +6940,7 @@
             <a:buNone/>
           </a:pPr>
           <a:r>
-            <a:rPr lang="en-US" sz="1300" b="1" kern="1200" dirty="0">
+            <a:rPr lang="en-US" sz="1400" b="1" kern="1200" dirty="0">
               <a:solidFill>
                 <a:srgbClr val="00B0F0"/>
               </a:solidFill>
@@ -6945,20 +6948,20 @@
             <a:t>A</a:t>
           </a:r>
           <a:r>
-            <a:rPr lang="en-US" sz="1300" kern="1200" dirty="0"/>
+            <a:rPr lang="en-US" sz="1400" kern="1200" dirty="0"/>
             <a:t> is </a:t>
           </a:r>
           <a:r>
-            <a:rPr lang="en-US" sz="1300" i="1" kern="1200" dirty="0"/>
+            <a:rPr lang="en-US" sz="1400" i="1" kern="1200" dirty="0"/>
             <a:t>Disjoint</a:t>
           </a:r>
           <a:r>
-            <a:rPr lang="en-US" sz="1300" kern="1200" dirty="0"/>
+            <a:rPr lang="en-US" sz="1400" kern="1200" dirty="0"/>
             <a:t> </a:t>
           </a:r>
         </a:p>
         <a:p>
-          <a:pPr marL="0" lvl="0" indent="0" algn="ctr" defTabSz="577850">
+          <a:pPr marL="0" lvl="0" indent="0" algn="ctr" defTabSz="622300">
             <a:lnSpc>
               <a:spcPct val="90000"/>
             </a:lnSpc>
@@ -6971,11 +6974,11 @@
             <a:buNone/>
           </a:pPr>
           <a:r>
-            <a:rPr lang="en-US" sz="1300" kern="1200" dirty="0"/>
+            <a:rPr lang="en-US" sz="1400" kern="1200" dirty="0"/>
             <a:t>with </a:t>
           </a:r>
           <a:r>
-            <a:rPr lang="en-US" sz="1300" b="1" kern="1200" dirty="0">
+            <a:rPr lang="en-US" sz="1400" b="1" kern="1200" dirty="0">
               <a:solidFill>
                 <a:srgbClr val="00B050"/>
               </a:solidFill>
@@ -6983,15 +6986,15 @@
             <a:t>B</a:t>
           </a:r>
           <a:r>
-            <a:rPr lang="en-US" sz="1300" kern="1200" dirty="0"/>
+            <a:rPr lang="en-US" sz="1400" kern="1200" dirty="0"/>
             <a:t> </a:t>
           </a:r>
-          <a:endParaRPr lang="en-CA" sz="1300" kern="1200" dirty="0"/>
+          <a:endParaRPr lang="en-CA" sz="1400" kern="1200" dirty="0"/>
         </a:p>
       </dsp:txBody>
       <dsp:txXfrm>
-        <a:off x="10991544" y="1112473"/>
-        <a:ext cx="1151500" cy="422091"/>
+        <a:off x="10436612" y="14148"/>
+        <a:ext cx="1623092" cy="454763"/>
       </dsp:txXfrm>
     </dsp:sp>
     <dsp:sp modelId="{0B134E92-FA95-4B28-BD52-07F1716B3C18}">
@@ -7000,9 +7003,9 @@
         <dsp:cNvSpPr/>
       </dsp:nvSpPr>
       <dsp:spPr>
-        <a:xfrm rot="837097">
-          <a:off x="9507097" y="1753603"/>
-          <a:ext cx="1493342" cy="47548"/>
+        <a:xfrm rot="1420745">
+          <a:off x="9405568" y="868970"/>
+          <a:ext cx="1081696" cy="32004"/>
         </a:xfrm>
         <a:custGeom>
           <a:avLst/>
@@ -7013,18 +7016,18 @@
           <a:pathLst>
             <a:path>
               <a:moveTo>
-                <a:pt x="0" y="23774"/>
+                <a:pt x="0" y="16002"/>
               </a:moveTo>
               <a:lnTo>
-                <a:pt x="586836" y="23774"/>
+                <a:pt x="374368" y="16002"/>
               </a:lnTo>
             </a:path>
             <a:path>
               <a:moveTo>
-                <a:pt x="906505" y="23774"/>
+                <a:pt x="707328" y="16002"/>
               </a:moveTo>
               <a:lnTo>
-                <a:pt x="1493342" y="23774"/>
+                <a:pt x="1081696" y="16002"/>
               </a:lnTo>
             </a:path>
           </a:pathLst>
@@ -7090,8 +7093,8 @@
         </a:p>
       </dsp:txBody>
       <dsp:txXfrm>
-        <a:off x="10093933" y="1590709"/>
-        <a:ext cx="319668" cy="373335"/>
+        <a:off x="9779936" y="749761"/>
+        <a:ext cx="332959" cy="270424"/>
       </dsp:txXfrm>
     </dsp:sp>
     <dsp:sp modelId="{DE55BEF5-93B4-4A69-A6D6-1C09C42D422D}">
@@ -7101,8 +7104,8 @@
       </dsp:nvSpPr>
       <dsp:spPr>
         <a:xfrm>
-          <a:off x="10978412" y="1819438"/>
-          <a:ext cx="1177764" cy="275926"/>
+          <a:off x="10441730" y="965022"/>
+          <a:ext cx="1651388" cy="274324"/>
         </a:xfrm>
         <a:prstGeom prst="roundRect">
           <a:avLst>
@@ -7161,12 +7164,12 @@
         </a:fontRef>
       </dsp:style>
       <dsp:txBody>
-        <a:bodyPr spcFirstLastPara="0" vert="horz" wrap="square" lIns="8255" tIns="8255" rIns="8255" bIns="8255" numCol="1" spcCol="1270" anchor="ctr" anchorCtr="0">
+        <a:bodyPr spcFirstLastPara="0" vert="horz" wrap="square" lIns="8890" tIns="8890" rIns="8890" bIns="8890" numCol="1" spcCol="1270" anchor="ctr" anchorCtr="0">
           <a:noAutofit/>
         </a:bodyPr>
         <a:lstStyle/>
         <a:p>
-          <a:pPr marL="0" lvl="0" indent="0" algn="ctr" defTabSz="577850">
+          <a:pPr marL="0" lvl="0" indent="0" algn="ctr" defTabSz="622300">
             <a:lnSpc>
               <a:spcPct val="90000"/>
             </a:lnSpc>
@@ -7179,7 +7182,7 @@
             <a:buNone/>
           </a:pPr>
           <a:r>
-            <a:rPr lang="en-US" sz="1300" b="1" kern="1200" dirty="0">
+            <a:rPr lang="en-US" sz="1400" b="1" kern="1200" dirty="0">
               <a:solidFill>
                 <a:srgbClr val="00B0F0"/>
               </a:solidFill>
@@ -7187,23 +7190,23 @@
             <a:t>A</a:t>
           </a:r>
           <a:r>
-            <a:rPr lang="en-US" sz="1300" kern="1200" dirty="0"/>
+            <a:rPr lang="en-US" sz="1400" kern="1200" dirty="0"/>
             <a:t> Shelters </a:t>
           </a:r>
           <a:r>
-            <a:rPr lang="en-US" sz="1300" b="1" kern="1200" dirty="0">
+            <a:rPr lang="en-US" sz="1400" b="1" kern="1200" dirty="0">
               <a:solidFill>
                 <a:srgbClr val="00B050"/>
               </a:solidFill>
             </a:rPr>
             <a:t>B</a:t>
           </a:r>
-          <a:endParaRPr lang="en-CA" sz="1300" kern="1200" dirty="0"/>
+          <a:endParaRPr lang="en-CA" sz="1400" kern="1200" dirty="0"/>
         </a:p>
       </dsp:txBody>
       <dsp:txXfrm>
-        <a:off x="10986494" y="1827520"/>
-        <a:ext cx="1161600" cy="259762"/>
+        <a:off x="10449765" y="973057"/>
+        <a:ext cx="1635318" cy="258254"/>
       </dsp:txXfrm>
     </dsp:sp>
     <dsp:sp modelId="{53585537-C841-4613-9227-8942CC9F940E}">
@@ -7212,9 +7215,9 @@
         <dsp:cNvSpPr/>
       </dsp:nvSpPr>
       <dsp:spPr>
-        <a:xfrm rot="1335299">
-          <a:off x="6823927" y="2143946"/>
-          <a:ext cx="1565938" cy="47548"/>
+        <a:xfrm rot="1854996">
+          <a:off x="6732239" y="1380560"/>
+          <a:ext cx="1145907" cy="32004"/>
         </a:xfrm>
         <a:custGeom>
           <a:avLst/>
@@ -7225,18 +7228,18 @@
           <a:pathLst>
             <a:path>
               <a:moveTo>
-                <a:pt x="0" y="23774"/>
+                <a:pt x="0" y="16002"/>
               </a:moveTo>
               <a:lnTo>
-                <a:pt x="615365" y="23774"/>
+                <a:pt x="410019" y="16002"/>
               </a:lnTo>
             </a:path>
             <a:path>
               <a:moveTo>
-                <a:pt x="950573" y="23774"/>
+                <a:pt x="735887" y="16002"/>
               </a:moveTo>
               <a:lnTo>
-                <a:pt x="1565938" y="23774"/>
+                <a:pt x="1145907" y="16002"/>
               </a:lnTo>
             </a:path>
           </a:pathLst>
@@ -7302,8 +7305,8 @@
         </a:p>
       </dsp:txBody>
       <dsp:txXfrm>
-        <a:off x="7439292" y="1971978"/>
-        <a:ext cx="335208" cy="391484"/>
+        <a:off x="7142259" y="1253324"/>
+        <a:ext cx="325867" cy="286476"/>
       </dsp:txXfrm>
     </dsp:sp>
     <dsp:sp modelId="{EFD08717-F61D-4FA3-AEAA-43BEC3867CFC}">
@@ -7313,8 +7316,8 @@
       </dsp:nvSpPr>
       <dsp:spPr>
         <a:xfrm>
-          <a:off x="8331540" y="2326290"/>
-          <a:ext cx="1195699" cy="275926"/>
+          <a:off x="7796739" y="1553778"/>
+          <a:ext cx="1651388" cy="274324"/>
         </a:xfrm>
         <a:prstGeom prst="roundRect">
           <a:avLst>
@@ -7373,12 +7376,12 @@
         </a:fontRef>
       </dsp:style>
       <dsp:txBody>
-        <a:bodyPr spcFirstLastPara="0" vert="horz" wrap="square" lIns="8255" tIns="8255" rIns="8255" bIns="8255" numCol="1" spcCol="1270" anchor="ctr" anchorCtr="0">
+        <a:bodyPr spcFirstLastPara="0" vert="horz" wrap="square" lIns="8890" tIns="8890" rIns="8890" bIns="8890" numCol="1" spcCol="1270" anchor="ctr" anchorCtr="0">
           <a:noAutofit/>
         </a:bodyPr>
         <a:lstStyle/>
         <a:p>
-          <a:pPr marL="0" lvl="0" indent="0" algn="ctr" defTabSz="577850">
+          <a:pPr marL="0" lvl="0" indent="0" algn="ctr" defTabSz="622300">
             <a:lnSpc>
               <a:spcPct val="90000"/>
             </a:lnSpc>
@@ -7391,7 +7394,7 @@
             <a:buNone/>
           </a:pPr>
           <a:r>
-            <a:rPr lang="en-US" sz="1300" b="1" kern="1200" dirty="0">
+            <a:rPr lang="en-US" sz="1400" b="1" kern="1200" dirty="0">
               <a:solidFill>
                 <a:srgbClr val="00B0F0"/>
               </a:solidFill>
@@ -7399,26 +7402,26 @@
             <a:t>A</a:t>
           </a:r>
           <a:r>
-            <a:rPr lang="en-US" sz="1300" kern="1200" dirty="0"/>
+            <a:rPr lang="en-US" sz="1400" kern="1200" dirty="0"/>
             <a:t> </a:t>
           </a:r>
           <a:r>
-            <a:rPr lang="en-US" sz="1300" i="1" kern="1200" dirty="0"/>
+            <a:rPr lang="en-US" sz="1400" i="1" kern="1200" dirty="0"/>
             <a:t>Surrounds</a:t>
           </a:r>
           <a:r>
-            <a:rPr lang="en-US" sz="1300" kern="1200" dirty="0"/>
+            <a:rPr lang="en-US" sz="1400" kern="1200" dirty="0"/>
             <a:t> </a:t>
           </a:r>
           <a:r>
-            <a:rPr lang="en-US" sz="1300" b="1" kern="1200" dirty="0">
+            <a:rPr lang="en-US" sz="1400" b="1" kern="1200" dirty="0">
               <a:solidFill>
                 <a:srgbClr val="00B050"/>
               </a:solidFill>
             </a:rPr>
             <a:t>B</a:t>
           </a:r>
-          <a:endParaRPr lang="en-CA" sz="1300" b="1" kern="1200" dirty="0">
+          <a:endParaRPr lang="en-CA" sz="1400" b="1" kern="1200" dirty="0">
             <a:solidFill>
               <a:srgbClr val="00B050"/>
             </a:solidFill>
@@ -7426,8 +7429,8 @@
         </a:p>
       </dsp:txBody>
       <dsp:txXfrm>
-        <a:off x="8339622" y="2334372"/>
-        <a:ext cx="1179535" cy="259762"/>
+        <a:off x="7804774" y="1561813"/>
+        <a:ext cx="1635318" cy="258254"/>
       </dsp:txXfrm>
     </dsp:sp>
     <dsp:sp modelId="{7940BBF2-D172-46D0-90EF-BFC9EA425F6D}">
@@ -7436,9 +7439,9 @@
         <dsp:cNvSpPr/>
       </dsp:nvSpPr>
       <dsp:spPr>
-        <a:xfrm rot="1560803">
-          <a:off x="4041807" y="2908339"/>
-          <a:ext cx="1612664" cy="47548"/>
+        <a:xfrm rot="2927713">
+          <a:off x="3971746" y="2514471"/>
+          <a:ext cx="1565693" cy="32004"/>
         </a:xfrm>
         <a:custGeom>
           <a:avLst/>
@@ -7449,18 +7452,18 @@
           <a:pathLst>
             <a:path>
               <a:moveTo>
-                <a:pt x="0" y="23774"/>
+                <a:pt x="0" y="16002"/>
               </a:moveTo>
               <a:lnTo>
-                <a:pt x="633726" y="23774"/>
+                <a:pt x="615268" y="16002"/>
               </a:lnTo>
             </a:path>
             <a:path>
               <a:moveTo>
-                <a:pt x="978937" y="23774"/>
+                <a:pt x="950425" y="16002"/>
               </a:moveTo>
               <a:lnTo>
-                <a:pt x="1612664" y="23774"/>
+                <a:pt x="1565693" y="16002"/>
               </a:lnTo>
             </a:path>
           </a:pathLst>
@@ -7526,8 +7529,8 @@
         </a:p>
       </dsp:txBody>
       <dsp:txXfrm>
-        <a:off x="4675534" y="2730530"/>
-        <a:ext cx="345211" cy="403166"/>
+        <a:off x="4587015" y="2334761"/>
+        <a:ext cx="335156" cy="391423"/>
       </dsp:txXfrm>
     </dsp:sp>
     <dsp:sp modelId="{C33B4FFC-EE71-4E57-B768-C2BD25E243E8}">
@@ -7537,8 +7540,8 @@
       </dsp:nvSpPr>
       <dsp:spPr>
         <a:xfrm>
-          <a:off x="5572784" y="2825869"/>
-          <a:ext cx="1309468" cy="919772"/>
+          <a:off x="5270295" y="2809909"/>
+          <a:ext cx="1651388" cy="619093"/>
         </a:xfrm>
         <a:prstGeom prst="roundRect">
           <a:avLst>
@@ -7583,12 +7586,12 @@
         </a:fontRef>
       </dsp:style>
       <dsp:txBody>
-        <a:bodyPr spcFirstLastPara="0" vert="horz" wrap="square" lIns="8255" tIns="8255" rIns="8255" bIns="8255" numCol="1" spcCol="1270" anchor="ctr" anchorCtr="0">
+        <a:bodyPr spcFirstLastPara="0" vert="horz" wrap="square" lIns="8890" tIns="8890" rIns="8890" bIns="8890" numCol="1" spcCol="1270" anchor="ctr" anchorCtr="0">
           <a:noAutofit/>
         </a:bodyPr>
         <a:lstStyle/>
         <a:p>
-          <a:pPr marL="0" lvl="0" indent="0" algn="ctr" defTabSz="577850">
+          <a:pPr marL="0" lvl="0" indent="0" algn="ctr" defTabSz="622300">
             <a:lnSpc>
               <a:spcPct val="90000"/>
             </a:lnSpc>
@@ -7601,15 +7604,15 @@
             <a:buNone/>
           </a:pPr>
           <a:r>
-            <a:rPr lang="en-CA" sz="1300" kern="1200" dirty="0"/>
+            <a:rPr lang="en-CA" sz="1400" kern="1200" dirty="0"/>
             <a:t>Does the external boundary </a:t>
           </a:r>
           <a:r>
-            <a:rPr lang="en-US" sz="1300" kern="1200" dirty="0"/>
+            <a:rPr lang="en-US" sz="1400" kern="1200" dirty="0"/>
             <a:t>of </a:t>
           </a:r>
           <a:r>
-            <a:rPr lang="en-US" sz="1300" b="1" kern="1200" dirty="0">
+            <a:rPr lang="en-US" sz="1400" b="1" kern="1200" dirty="0">
               <a:solidFill>
                 <a:srgbClr val="00B0F0"/>
               </a:solidFill>
@@ -7617,11 +7620,11 @@
             <a:t>A </a:t>
           </a:r>
           <a:r>
-            <a:rPr lang="en-US" sz="1300" kern="1200" dirty="0"/>
-            <a:t>encompass </a:t>
-          </a:r>
-          <a:r>
-            <a:rPr lang="en-US" sz="1300" b="1" kern="1200" dirty="0">
+            <a:rPr lang="en-US" sz="1400" kern="1200" dirty="0"/>
+            <a:t>encompass all of </a:t>
+          </a:r>
+          <a:r>
+            <a:rPr lang="en-US" sz="1400" b="1" kern="1200" dirty="0">
               <a:solidFill>
                 <a:srgbClr val="00B050"/>
               </a:solidFill>
@@ -7629,10 +7632,10 @@
             <a:t>B</a:t>
           </a:r>
           <a:r>
-            <a:rPr lang="en-US" sz="1300" kern="1200" dirty="0"/>
+            <a:rPr lang="en-US" sz="1400" kern="1200" dirty="0"/>
             <a:t>?</a:t>
           </a:r>
-          <a:endParaRPr lang="en-CA" sz="1300" b="1" kern="1200" dirty="0">
+          <a:endParaRPr lang="en-CA" sz="1400" b="1" kern="1200" dirty="0">
             <a:solidFill>
               <a:srgbClr val="00B050"/>
             </a:solidFill>
@@ -7640,8 +7643,8 @@
         </a:p>
       </dsp:txBody>
       <dsp:txXfrm>
-        <a:off x="5599723" y="2852808"/>
-        <a:ext cx="1255590" cy="865894"/>
+        <a:off x="5288428" y="2828042"/>
+        <a:ext cx="1615122" cy="582827"/>
       </dsp:txXfrm>
     </dsp:sp>
     <dsp:sp modelId="{AF2C4515-2D24-4ADA-87E3-26CC2F6CC2A6}">
@@ -7650,9 +7653,9 @@
         <dsp:cNvSpPr/>
       </dsp:nvSpPr>
       <dsp:spPr>
-        <a:xfrm rot="20958027">
-          <a:off x="6869431" y="3125064"/>
-          <a:ext cx="1474931" cy="47548"/>
+        <a:xfrm rot="20010305">
+          <a:off x="6871391" y="2889826"/>
+          <a:ext cx="957714" cy="32004"/>
         </a:xfrm>
         <a:custGeom>
           <a:avLst/>
@@ -7663,18 +7666,18 @@
           <a:pathLst>
             <a:path>
               <a:moveTo>
-                <a:pt x="0" y="23774"/>
+                <a:pt x="0" y="16002"/>
               </a:moveTo>
               <a:lnTo>
-                <a:pt x="596886" y="23774"/>
+                <a:pt x="342682" y="16002"/>
               </a:lnTo>
             </a:path>
             <a:path>
               <a:moveTo>
-                <a:pt x="878044" y="23774"/>
+                <a:pt x="615032" y="16002"/>
               </a:moveTo>
               <a:lnTo>
-                <a:pt x="1474931" y="23774"/>
+                <a:pt x="957714" y="16002"/>
               </a:lnTo>
             </a:path>
           </a:pathLst>
@@ -7742,8 +7745,8 @@
         </a:p>
       </dsp:txBody>
       <dsp:txXfrm>
-        <a:off x="7466317" y="2964472"/>
-        <a:ext cx="281158" cy="368732"/>
+        <a:off x="7214074" y="2786114"/>
+        <a:ext cx="272350" cy="239428"/>
       </dsp:txXfrm>
     </dsp:sp>
     <dsp:sp modelId="{8557AC88-9D33-43F5-B999-D618E2615BC6}">
@@ -7753,8 +7756,8 @@
       </dsp:nvSpPr>
       <dsp:spPr>
         <a:xfrm>
-          <a:off x="8331540" y="2873958"/>
-          <a:ext cx="1195699" cy="275926"/>
+          <a:off x="7778814" y="2555039"/>
+          <a:ext cx="1651388" cy="274324"/>
         </a:xfrm>
         <a:prstGeom prst="roundRect">
           <a:avLst>
@@ -7813,12 +7816,12 @@
         </a:fontRef>
       </dsp:style>
       <dsp:txBody>
-        <a:bodyPr spcFirstLastPara="0" vert="horz" wrap="square" lIns="8255" tIns="8255" rIns="8255" bIns="8255" numCol="1" spcCol="1270" anchor="ctr" anchorCtr="0">
+        <a:bodyPr spcFirstLastPara="0" vert="horz" wrap="square" lIns="8890" tIns="8890" rIns="8890" bIns="8890" numCol="1" spcCol="1270" anchor="ctr" anchorCtr="0">
           <a:noAutofit/>
         </a:bodyPr>
         <a:lstStyle/>
         <a:p>
-          <a:pPr marL="0" lvl="0" indent="0" algn="ctr" defTabSz="577850">
+          <a:pPr marL="0" lvl="0" indent="0" algn="ctr" defTabSz="622300">
             <a:lnSpc>
               <a:spcPct val="90000"/>
             </a:lnSpc>
@@ -7831,7 +7834,7 @@
             <a:buNone/>
           </a:pPr>
           <a:r>
-            <a:rPr lang="en-US" sz="1300" b="1" kern="1200" dirty="0">
+            <a:rPr lang="en-US" sz="1400" b="1" kern="1200" dirty="0">
               <a:solidFill>
                 <a:srgbClr val="00B0F0"/>
               </a:solidFill>
@@ -7839,31 +7842,31 @@
             <a:t>A</a:t>
           </a:r>
           <a:r>
-            <a:rPr lang="en-US" sz="1300" kern="1200" dirty="0"/>
+            <a:rPr lang="en-US" sz="1400" kern="1200" dirty="0"/>
             <a:t> </a:t>
           </a:r>
           <a:r>
-            <a:rPr lang="en-CA" sz="1300" i="1" kern="1200" dirty="0"/>
+            <a:rPr lang="en-CA" sz="1400" i="1" kern="1200" dirty="0"/>
             <a:t>Borders</a:t>
           </a:r>
           <a:r>
-            <a:rPr lang="en-CA" sz="1300" kern="1200" dirty="0"/>
+            <a:rPr lang="en-CA" sz="1400" kern="1200" dirty="0"/>
             <a:t> </a:t>
           </a:r>
           <a:r>
-            <a:rPr lang="en-US" sz="1300" b="1" kern="1200" dirty="0">
+            <a:rPr lang="en-US" sz="1400" b="1" kern="1200" dirty="0">
               <a:solidFill>
                 <a:srgbClr val="00B050"/>
               </a:solidFill>
             </a:rPr>
             <a:t>B</a:t>
           </a:r>
-          <a:endParaRPr lang="en-CA" sz="1300" kern="1200" dirty="0"/>
+          <a:endParaRPr lang="en-CA" sz="1400" kern="1200" dirty="0"/>
         </a:p>
       </dsp:txBody>
       <dsp:txXfrm>
-        <a:off x="8339622" y="2882040"/>
-        <a:ext cx="1179535" cy="259762"/>
+        <a:off x="7786849" y="2563074"/>
+        <a:ext cx="1635318" cy="258254"/>
       </dsp:txXfrm>
     </dsp:sp>
     <dsp:sp modelId="{E9983D54-FC96-4942-9E52-FC69F6639DD3}">
@@ -7872,9 +7875,9 @@
         <dsp:cNvSpPr/>
       </dsp:nvSpPr>
       <dsp:spPr>
-        <a:xfrm rot="641973">
-          <a:off x="6869431" y="3398898"/>
-          <a:ext cx="1474931" cy="47548"/>
+        <a:xfrm rot="2032689">
+          <a:off x="6833048" y="3394475"/>
+          <a:ext cx="1044156" cy="32004"/>
         </a:xfrm>
         <a:custGeom>
           <a:avLst/>
@@ -7885,18 +7888,18 @@
           <a:pathLst>
             <a:path>
               <a:moveTo>
-                <a:pt x="0" y="23774"/>
+                <a:pt x="0" y="16002"/>
               </a:moveTo>
               <a:lnTo>
-                <a:pt x="562317" y="23774"/>
+                <a:pt x="361376" y="16002"/>
               </a:lnTo>
             </a:path>
             <a:path>
               <a:moveTo>
-                <a:pt x="912613" y="23774"/>
+                <a:pt x="682780" y="16002"/>
               </a:moveTo>
               <a:lnTo>
-                <a:pt x="1474931" y="23774"/>
+                <a:pt x="1044156" y="16002"/>
               </a:lnTo>
             </a:path>
           </a:pathLst>
@@ -7962,8 +7965,8 @@
         </a:p>
       </dsp:txBody>
       <dsp:txXfrm>
-        <a:off x="7431748" y="3238306"/>
-        <a:ext cx="350296" cy="368732"/>
+        <a:off x="7194424" y="3279957"/>
+        <a:ext cx="321404" cy="261039"/>
       </dsp:txXfrm>
     </dsp:sp>
     <dsp:sp modelId="{2F8B85E9-6CF6-4115-A357-ABFC584D494E}">
@@ -7973,8 +7976,8 @@
       </dsp:nvSpPr>
       <dsp:spPr>
         <a:xfrm>
-          <a:off x="8331540" y="3421626"/>
-          <a:ext cx="1195699" cy="275926"/>
+          <a:off x="7788569" y="3564336"/>
+          <a:ext cx="1651388" cy="274324"/>
         </a:xfrm>
         <a:prstGeom prst="roundRect">
           <a:avLst>
@@ -8033,12 +8036,12 @@
         </a:fontRef>
       </dsp:style>
       <dsp:txBody>
-        <a:bodyPr spcFirstLastPara="0" vert="horz" wrap="square" lIns="8255" tIns="8255" rIns="8255" bIns="8255" numCol="1" spcCol="1270" anchor="ctr" anchorCtr="0">
+        <a:bodyPr spcFirstLastPara="0" vert="horz" wrap="square" lIns="8890" tIns="8890" rIns="8890" bIns="8890" numCol="1" spcCol="1270" anchor="ctr" anchorCtr="0">
           <a:noAutofit/>
         </a:bodyPr>
         <a:lstStyle/>
         <a:p>
-          <a:pPr marL="0" lvl="0" indent="0" algn="ctr" defTabSz="577850">
+          <a:pPr marL="0" lvl="0" indent="0" algn="ctr" defTabSz="622300">
             <a:lnSpc>
               <a:spcPct val="90000"/>
             </a:lnSpc>
@@ -8051,7 +8054,7 @@
             <a:buNone/>
           </a:pPr>
           <a:r>
-            <a:rPr lang="en-US" sz="1300" b="1" kern="1200" dirty="0">
+            <a:rPr lang="en-US" sz="1400" b="1" kern="1200" dirty="0">
               <a:solidFill>
                 <a:srgbClr val="00B0F0"/>
               </a:solidFill>
@@ -8059,31 +8062,31 @@
             <a:t>A</a:t>
           </a:r>
           <a:r>
-            <a:rPr lang="en-US" sz="1300" kern="1200" dirty="0"/>
+            <a:rPr lang="en-US" sz="1400" kern="1200" dirty="0"/>
             <a:t> </a:t>
           </a:r>
           <a:r>
-            <a:rPr lang="en-CA" sz="1300" i="1" kern="1200" dirty="0"/>
+            <a:rPr lang="en-CA" sz="1400" i="1" kern="1200" dirty="0"/>
             <a:t>Confines</a:t>
           </a:r>
           <a:r>
-            <a:rPr lang="en-CA" sz="1300" kern="1200" dirty="0"/>
+            <a:rPr lang="en-CA" sz="1400" kern="1200" dirty="0"/>
             <a:t> </a:t>
           </a:r>
           <a:r>
-            <a:rPr lang="en-US" sz="1300" b="1" kern="1200" dirty="0">
+            <a:rPr lang="en-US" sz="1400" b="1" kern="1200" dirty="0">
               <a:solidFill>
                 <a:srgbClr val="00B050"/>
               </a:solidFill>
             </a:rPr>
             <a:t>B</a:t>
           </a:r>
-          <a:endParaRPr lang="en-CA" sz="1300" kern="1200" dirty="0"/>
+          <a:endParaRPr lang="en-CA" sz="1400" kern="1200" dirty="0"/>
         </a:p>
       </dsp:txBody>
       <dsp:txXfrm>
-        <a:off x="8339622" y="3429708"/>
-        <a:ext cx="1179535" cy="259762"/>
+        <a:off x="7796604" y="3572371"/>
+        <a:ext cx="1635318" cy="258254"/>
       </dsp:txXfrm>
     </dsp:sp>
     <dsp:sp modelId="{1903229A-54A0-45D6-928C-45BC37FEA4DB}">
@@ -8092,9 +8095,9 @@
         <dsp:cNvSpPr/>
       </dsp:nvSpPr>
       <dsp:spPr>
-        <a:xfrm rot="2409909">
-          <a:off x="1116166" y="4389547"/>
-          <a:ext cx="1896506" cy="47548"/>
+        <a:xfrm rot="3986295">
+          <a:off x="947255" y="4858098"/>
+          <a:ext cx="2334277" cy="32004"/>
         </a:xfrm>
         <a:custGeom>
           <a:avLst/>
@@ -8105,18 +8108,18 @@
           <a:pathLst>
             <a:path>
               <a:moveTo>
-                <a:pt x="0" y="23774"/>
+                <a:pt x="0" y="16002"/>
               </a:moveTo>
               <a:lnTo>
-                <a:pt x="767492" y="23774"/>
+                <a:pt x="999362" y="16002"/>
               </a:lnTo>
             </a:path>
             <a:path>
               <a:moveTo>
-                <a:pt x="1129013" y="23774"/>
+                <a:pt x="1334914" y="16002"/>
               </a:moveTo>
               <a:lnTo>
-                <a:pt x="1896506" y="23774"/>
+                <a:pt x="2334277" y="16002"/>
               </a:lnTo>
             </a:path>
           </a:pathLst>
@@ -8182,8 +8185,8 @@
         </a:p>
       </dsp:txBody>
       <dsp:txXfrm>
-        <a:off x="1883659" y="4176258"/>
-        <a:ext cx="361521" cy="474126"/>
+        <a:off x="1946618" y="4582316"/>
+        <a:ext cx="335552" cy="583569"/>
       </dsp:txXfrm>
     </dsp:sp>
     <dsp:sp modelId="{3FBAFE53-594D-4D03-B138-006A0BB47A9C}">
@@ -8193,8 +8196,8 @@
       </dsp:nvSpPr>
       <dsp:spPr>
         <a:xfrm>
-          <a:off x="2789063" y="4613458"/>
-          <a:ext cx="1334432" cy="822960"/>
+          <a:off x="2580943" y="5629833"/>
+          <a:ext cx="1651388" cy="628202"/>
         </a:xfrm>
         <a:prstGeom prst="roundRect">
           <a:avLst>
@@ -8239,12 +8242,12 @@
         </a:fontRef>
       </dsp:style>
       <dsp:txBody>
-        <a:bodyPr spcFirstLastPara="0" vert="horz" wrap="square" lIns="8255" tIns="8255" rIns="8255" bIns="8255" numCol="1" spcCol="1270" anchor="ctr" anchorCtr="0">
+        <a:bodyPr spcFirstLastPara="0" vert="horz" wrap="square" lIns="8890" tIns="8890" rIns="8890" bIns="8890" numCol="1" spcCol="1270" anchor="ctr" anchorCtr="0">
           <a:noAutofit/>
         </a:bodyPr>
         <a:lstStyle/>
         <a:p>
-          <a:pPr marL="0" lvl="0" indent="0" algn="ctr" defTabSz="577850">
+          <a:pPr marL="0" lvl="0" indent="0" algn="ctr" defTabSz="622300">
             <a:lnSpc>
               <a:spcPct val="90000"/>
             </a:lnSpc>
@@ -8257,11 +8260,11 @@
             <a:buNone/>
           </a:pPr>
           <a:r>
-            <a:rPr lang="en-US" sz="1300" kern="1200" dirty="0"/>
+            <a:rPr lang="en-US" sz="1400" kern="1200" dirty="0"/>
             <a:t>Does the exterior of </a:t>
           </a:r>
           <a:r>
-            <a:rPr lang="en-US" sz="1300" b="1" kern="1200" dirty="0">
+            <a:rPr lang="en-US" sz="1400" b="1" kern="1200" dirty="0">
               <a:solidFill>
                 <a:srgbClr val="00B0F0"/>
               </a:solidFill>
@@ -8269,11 +8272,11 @@
             <a:t>A</a:t>
           </a:r>
           <a:r>
-            <a:rPr lang="en-US" sz="1300" kern="1200" dirty="0"/>
+            <a:rPr lang="en-US" sz="1400" kern="1200" dirty="0"/>
             <a:t> overlap with the interior of </a:t>
           </a:r>
           <a:r>
-            <a:rPr lang="en-US" sz="1300" b="1" kern="1200" dirty="0">
+            <a:rPr lang="en-US" sz="1400" b="1" kern="1200" dirty="0">
               <a:solidFill>
                 <a:srgbClr val="00B050"/>
               </a:solidFill>
@@ -8281,15 +8284,15 @@
             <a:t>B</a:t>
           </a:r>
           <a:r>
-            <a:rPr lang="en-US" sz="1300" kern="1200" dirty="0"/>
+            <a:rPr lang="en-US" sz="1400" kern="1200" dirty="0"/>
             <a:t>?  </a:t>
           </a:r>
-          <a:endParaRPr lang="en-CA" sz="1300" kern="1200" dirty="0"/>
+          <a:endParaRPr lang="en-CA" sz="1400" kern="1200" dirty="0"/>
         </a:p>
       </dsp:txBody>
       <dsp:txXfrm>
-        <a:off x="2813167" y="4637562"/>
-        <a:ext cx="1286224" cy="774752"/>
+        <a:off x="2599342" y="5648232"/>
+        <a:ext cx="1614590" cy="591404"/>
       </dsp:txXfrm>
     </dsp:sp>
     <dsp:sp modelId="{1877F5C3-3D89-4C58-A1F1-078525DE5F22}">
@@ -8298,9 +8301,9 @@
         <dsp:cNvSpPr/>
       </dsp:nvSpPr>
       <dsp:spPr>
-        <a:xfrm rot="20958027">
-          <a:off x="4110674" y="4864246"/>
-          <a:ext cx="1474931" cy="47548"/>
+        <a:xfrm rot="19705109">
+          <a:off x="4151545" y="5642264"/>
+          <a:ext cx="1090938" cy="32004"/>
         </a:xfrm>
         <a:custGeom>
           <a:avLst/>
@@ -8311,18 +8314,18 @@
           <a:pathLst>
             <a:path>
               <a:moveTo>
-                <a:pt x="0" y="23774"/>
+                <a:pt x="0" y="16002"/>
               </a:moveTo>
               <a:lnTo>
-                <a:pt x="596886" y="23774"/>
+                <a:pt x="403135" y="16002"/>
               </a:lnTo>
             </a:path>
             <a:path>
               <a:moveTo>
-                <a:pt x="878044" y="23774"/>
+                <a:pt x="687802" y="16002"/>
               </a:moveTo>
               <a:lnTo>
-                <a:pt x="1474931" y="23774"/>
+                <a:pt x="1090938" y="16002"/>
               </a:lnTo>
             </a:path>
           </a:pathLst>
@@ -8388,8 +8391,8 @@
         </a:p>
       </dsp:txBody>
       <dsp:txXfrm>
-        <a:off x="4707560" y="4703654"/>
-        <a:ext cx="281158" cy="368732"/>
+        <a:off x="4554681" y="5521899"/>
+        <a:ext cx="284666" cy="272734"/>
       </dsp:txXfrm>
     </dsp:sp>
     <dsp:sp modelId="{752E73D5-6F0C-4299-B028-43DCAE9EBF12}">
@@ -8399,8 +8402,8 @@
       </dsp:nvSpPr>
       <dsp:spPr>
         <a:xfrm>
-          <a:off x="5572784" y="4291217"/>
-          <a:ext cx="1309468" cy="919772"/>
+          <a:off x="5161697" y="5063051"/>
+          <a:ext cx="1651388" cy="619093"/>
         </a:xfrm>
         <a:prstGeom prst="roundRect">
           <a:avLst>
@@ -8445,12 +8448,12 @@
         </a:fontRef>
       </dsp:style>
       <dsp:txBody>
-        <a:bodyPr spcFirstLastPara="0" vert="horz" wrap="square" lIns="8255" tIns="8255" rIns="8255" bIns="8255" numCol="1" spcCol="1270" anchor="ctr" anchorCtr="0">
+        <a:bodyPr spcFirstLastPara="0" vert="horz" wrap="square" lIns="8890" tIns="8890" rIns="8890" bIns="8890" numCol="1" spcCol="1270" anchor="ctr" anchorCtr="0">
           <a:noAutofit/>
         </a:bodyPr>
         <a:lstStyle/>
         <a:p>
-          <a:pPr marL="0" lvl="0" indent="0" algn="ctr" defTabSz="577850">
+          <a:pPr marL="0" lvl="0" indent="0" algn="ctr" defTabSz="622300">
             <a:lnSpc>
               <a:spcPct val="90000"/>
             </a:lnSpc>
@@ -8463,11 +8466,11 @@
             <a:buNone/>
           </a:pPr>
           <a:r>
-            <a:rPr lang="en-US" sz="1300" kern="1200" dirty="0"/>
+            <a:rPr lang="en-US" sz="1400" kern="1200" dirty="0"/>
             <a:t>Does the border of </a:t>
           </a:r>
           <a:r>
-            <a:rPr lang="en-US" sz="1300" b="1" kern="1200" dirty="0">
+            <a:rPr lang="en-US" sz="1400" b="1" kern="1200" dirty="0">
               <a:solidFill>
                 <a:srgbClr val="00B0F0"/>
               </a:solidFill>
@@ -8475,11 +8478,11 @@
             <a:t>A</a:t>
           </a:r>
           <a:r>
-            <a:rPr lang="en-US" sz="1300" kern="1200" dirty="0"/>
+            <a:rPr lang="en-US" sz="1400" kern="1200" dirty="0"/>
             <a:t> overlap with the border of </a:t>
           </a:r>
           <a:r>
-            <a:rPr lang="en-US" sz="1300" b="1" kern="1200" dirty="0">
+            <a:rPr lang="en-US" sz="1400" b="1" kern="1200" dirty="0">
               <a:solidFill>
                 <a:srgbClr val="00B050"/>
               </a:solidFill>
@@ -8487,15 +8490,15 @@
             <a:t>B</a:t>
           </a:r>
           <a:r>
-            <a:rPr lang="en-US" sz="1300" kern="1200" dirty="0"/>
+            <a:rPr lang="en-US" sz="1400" kern="1200" dirty="0"/>
             <a:t>? </a:t>
           </a:r>
-          <a:endParaRPr lang="en-CA" sz="1300" kern="1200" dirty="0"/>
+          <a:endParaRPr lang="en-CA" sz="1400" kern="1200" dirty="0"/>
         </a:p>
       </dsp:txBody>
       <dsp:txXfrm>
-        <a:off x="5599723" y="4318156"/>
-        <a:ext cx="1255590" cy="865894"/>
+        <a:off x="5179830" y="5081184"/>
+        <a:ext cx="1615122" cy="582827"/>
       </dsp:txXfrm>
     </dsp:sp>
     <dsp:sp modelId="{49F9E345-50CC-4F52-AFB5-C0A28306BF16}">
@@ -8504,9 +8507,9 @@
         <dsp:cNvSpPr/>
       </dsp:nvSpPr>
       <dsp:spPr>
-        <a:xfrm rot="20259238">
-          <a:off x="6823416" y="4429451"/>
-          <a:ext cx="1566959" cy="47548"/>
+        <a:xfrm rot="19443971">
+          <a:off x="6698542" y="5003373"/>
+          <a:ext cx="1203789" cy="32004"/>
         </a:xfrm>
         <a:custGeom>
           <a:avLst/>
@@ -8517,18 +8520,18 @@
           <a:pathLst>
             <a:path>
               <a:moveTo>
-                <a:pt x="0" y="23774"/>
+                <a:pt x="0" y="16002"/>
               </a:moveTo>
               <a:lnTo>
-                <a:pt x="634129" y="23774"/>
+                <a:pt x="458944" y="16002"/>
               </a:lnTo>
             </a:path>
             <a:path>
               <a:moveTo>
-                <a:pt x="932830" y="23774"/>
+                <a:pt x="744844" y="16002"/>
               </a:moveTo>
               <a:lnTo>
-                <a:pt x="1566959" y="23774"/>
+                <a:pt x="1203789" y="16002"/>
               </a:lnTo>
             </a:path>
           </a:pathLst>
@@ -8596,8 +8599,8 @@
         </a:p>
       </dsp:txBody>
       <dsp:txXfrm>
-        <a:off x="7457545" y="4257355"/>
-        <a:ext cx="298701" cy="391739"/>
+        <a:off x="7157487" y="4868902"/>
+        <a:ext cx="285900" cy="300947"/>
       </dsp:txXfrm>
     </dsp:sp>
     <dsp:sp modelId="{F37F940C-FB29-4D0E-B70D-83659D265A1E}">
@@ -8607,8 +8610,8 @@
       </dsp:nvSpPr>
       <dsp:spPr>
         <a:xfrm>
-          <a:off x="8331540" y="4017383"/>
-          <a:ext cx="1195699" cy="275926"/>
+          <a:off x="7787788" y="4528991"/>
+          <a:ext cx="1651388" cy="274324"/>
         </a:xfrm>
         <a:prstGeom prst="roundRect">
           <a:avLst>
@@ -8667,12 +8670,12 @@
         </a:fontRef>
       </dsp:style>
       <dsp:txBody>
-        <a:bodyPr spcFirstLastPara="0" vert="horz" wrap="square" lIns="8255" tIns="8255" rIns="8255" bIns="8255" numCol="1" spcCol="1270" anchor="ctr" anchorCtr="0">
+        <a:bodyPr spcFirstLastPara="0" vert="horz" wrap="square" lIns="8890" tIns="8890" rIns="8890" bIns="8890" numCol="1" spcCol="1270" anchor="ctr" anchorCtr="0">
           <a:noAutofit/>
         </a:bodyPr>
         <a:lstStyle/>
         <a:p>
-          <a:pPr marL="0" lvl="0" indent="0" algn="ctr" defTabSz="577850">
+          <a:pPr marL="0" lvl="0" indent="0" algn="ctr" defTabSz="622300">
             <a:lnSpc>
               <a:spcPct val="90000"/>
             </a:lnSpc>
@@ -8685,7 +8688,7 @@
             <a:buNone/>
           </a:pPr>
           <a:r>
-            <a:rPr lang="en-US" sz="1300" b="1" kern="1200" dirty="0">
+            <a:rPr lang="en-US" sz="1400" b="1" kern="1200" dirty="0">
               <a:solidFill>
                 <a:srgbClr val="00B0F0"/>
               </a:solidFill>
@@ -8693,31 +8696,31 @@
             <a:t>A</a:t>
           </a:r>
           <a:r>
-            <a:rPr lang="en-US" sz="1300" kern="1200" dirty="0"/>
+            <a:rPr lang="en-US" sz="1400" kern="1200" dirty="0"/>
             <a:t> </a:t>
           </a:r>
           <a:r>
-            <a:rPr lang="en-CA" sz="1300" i="1" kern="1200" dirty="0"/>
+            <a:rPr lang="en-CA" sz="1400" i="1" kern="1200" dirty="0"/>
             <a:t>Contains</a:t>
           </a:r>
           <a:r>
-            <a:rPr lang="en-CA" sz="1300" kern="1200" dirty="0"/>
+            <a:rPr lang="en-CA" sz="1400" kern="1200" dirty="0"/>
             <a:t> </a:t>
           </a:r>
           <a:r>
-            <a:rPr lang="en-US" sz="1300" b="1" kern="1200" dirty="0">
+            <a:rPr lang="en-US" sz="1400" b="1" kern="1200" dirty="0">
               <a:solidFill>
                 <a:srgbClr val="00B050"/>
               </a:solidFill>
             </a:rPr>
             <a:t>B</a:t>
           </a:r>
-          <a:endParaRPr lang="en-CA" sz="1300" kern="1200" dirty="0"/>
+          <a:endParaRPr lang="en-CA" sz="1400" kern="1200" dirty="0"/>
         </a:p>
       </dsp:txBody>
       <dsp:txXfrm>
-        <a:off x="8339622" y="4025465"/>
-        <a:ext cx="1179535" cy="259762"/>
+        <a:off x="7795823" y="4537026"/>
+        <a:ext cx="1635318" cy="258254"/>
       </dsp:txXfrm>
     </dsp:sp>
     <dsp:sp modelId="{FDDDA80B-6837-42EE-B31C-6D401D247906}">
@@ -8726,9 +8729,9 @@
         <dsp:cNvSpPr/>
       </dsp:nvSpPr>
       <dsp:spPr>
-        <a:xfrm rot="641973">
-          <a:off x="6869431" y="4864246"/>
-          <a:ext cx="1474931" cy="47548"/>
+        <a:xfrm rot="2056148">
+          <a:off x="6704091" y="5710129"/>
+          <a:ext cx="1255709" cy="32004"/>
         </a:xfrm>
         <a:custGeom>
           <a:avLst/>
@@ -8739,18 +8742,18 @@
           <a:pathLst>
             <a:path>
               <a:moveTo>
-                <a:pt x="0" y="23774"/>
+                <a:pt x="0" y="16002"/>
               </a:moveTo>
               <a:lnTo>
-                <a:pt x="562317" y="23774"/>
+                <a:pt x="464024" y="16002"/>
               </a:lnTo>
             </a:path>
             <a:path>
               <a:moveTo>
-                <a:pt x="912613" y="23774"/>
+                <a:pt x="791685" y="16002"/>
               </a:moveTo>
               <a:lnTo>
-                <a:pt x="1474931" y="23774"/>
+                <a:pt x="1255709" y="16002"/>
               </a:lnTo>
             </a:path>
           </a:pathLst>
@@ -8816,8 +8819,8 @@
         </a:p>
       </dsp:txBody>
       <dsp:txXfrm>
-        <a:off x="7431748" y="4703654"/>
-        <a:ext cx="350296" cy="368732"/>
+        <a:off x="7168115" y="5569168"/>
+        <a:ext cx="327661" cy="313927"/>
       </dsp:txXfrm>
     </dsp:sp>
     <dsp:sp modelId="{24F6AB9A-C44D-402F-B1AF-B011B11524E7}">
@@ -8827,8 +8830,8 @@
       </dsp:nvSpPr>
       <dsp:spPr>
         <a:xfrm>
-          <a:off x="8331540" y="4565051"/>
-          <a:ext cx="1195699" cy="919772"/>
+          <a:off x="7850806" y="5770118"/>
+          <a:ext cx="1651388" cy="619093"/>
         </a:xfrm>
         <a:prstGeom prst="roundRect">
           <a:avLst>
@@ -8873,12 +8876,12 @@
         </a:fontRef>
       </dsp:style>
       <dsp:txBody>
-        <a:bodyPr spcFirstLastPara="0" vert="horz" wrap="square" lIns="8255" tIns="8255" rIns="8255" bIns="8255" numCol="1" spcCol="1270" anchor="ctr" anchorCtr="0">
+        <a:bodyPr spcFirstLastPara="0" vert="horz" wrap="square" lIns="8890" tIns="8890" rIns="8890" bIns="8890" numCol="1" spcCol="1270" anchor="ctr" anchorCtr="0">
           <a:noAutofit/>
         </a:bodyPr>
         <a:lstStyle/>
         <a:p>
-          <a:pPr marL="0" lvl="0" indent="0" algn="ctr" defTabSz="577850">
+          <a:pPr marL="0" lvl="0" indent="0" algn="ctr" defTabSz="622300">
             <a:lnSpc>
               <a:spcPct val="90000"/>
             </a:lnSpc>
@@ -8891,11 +8894,11 @@
             <a:buNone/>
           </a:pPr>
           <a:r>
-            <a:rPr lang="en-US" sz="1300" kern="1200" dirty="0"/>
+            <a:rPr lang="en-US" sz="1400" kern="1200" dirty="0"/>
             <a:t>Does the interior of </a:t>
           </a:r>
           <a:r>
-            <a:rPr lang="en-US" sz="1300" b="1" kern="1200" dirty="0">
+            <a:rPr lang="en-US" sz="1400" b="1" kern="1200" dirty="0">
               <a:solidFill>
                 <a:srgbClr val="00B0F0"/>
               </a:solidFill>
@@ -8903,11 +8906,11 @@
             <a:t>A</a:t>
           </a:r>
           <a:r>
-            <a:rPr lang="en-US" sz="1300" kern="1200" dirty="0"/>
+            <a:rPr lang="en-US" sz="1400" kern="1200" dirty="0"/>
             <a:t> include the exterior of </a:t>
           </a:r>
           <a:r>
-            <a:rPr lang="en-US" sz="1300" b="1" kern="1200" dirty="0">
+            <a:rPr lang="en-US" sz="1400" b="1" kern="1200" dirty="0">
               <a:solidFill>
                 <a:srgbClr val="00B050"/>
               </a:solidFill>
@@ -8915,15 +8918,15 @@
             <a:t>B</a:t>
           </a:r>
           <a:r>
-            <a:rPr lang="en-US" sz="1300" kern="1200" dirty="0"/>
+            <a:rPr lang="en-US" sz="1400" kern="1200" dirty="0"/>
             <a:t>? </a:t>
           </a:r>
-          <a:endParaRPr lang="en-CA" sz="1300" kern="1200" dirty="0"/>
+          <a:endParaRPr lang="en-CA" sz="1400" kern="1200" dirty="0"/>
         </a:p>
       </dsp:txBody>
       <dsp:txXfrm>
-        <a:off x="8358479" y="4591990"/>
-        <a:ext cx="1141821" cy="865894"/>
+        <a:off x="7868939" y="5788251"/>
+        <a:ext cx="1615122" cy="582827"/>
       </dsp:txXfrm>
     </dsp:sp>
     <dsp:sp modelId="{8E7158E1-294C-4D33-8216-7B1B69CB68C3}">
@@ -8932,9 +8935,9 @@
         <dsp:cNvSpPr/>
       </dsp:nvSpPr>
       <dsp:spPr>
-        <a:xfrm rot="20958027">
-          <a:off x="9514418" y="4864246"/>
-          <a:ext cx="1474931" cy="47548"/>
+        <a:xfrm rot="19266355">
+          <a:off x="9367893" y="5683290"/>
+          <a:ext cx="1211601" cy="32004"/>
         </a:xfrm>
         <a:custGeom>
           <a:avLst/>
@@ -8945,18 +8948,18 @@
           <a:pathLst>
             <a:path>
               <a:moveTo>
-                <a:pt x="0" y="23774"/>
+                <a:pt x="0" y="16002"/>
               </a:moveTo>
               <a:lnTo>
-                <a:pt x="596886" y="23774"/>
+                <a:pt x="461923" y="16002"/>
               </a:lnTo>
             </a:path>
             <a:path>
               <a:moveTo>
-                <a:pt x="878044" y="23774"/>
+                <a:pt x="749678" y="16002"/>
               </a:moveTo>
               <a:lnTo>
-                <a:pt x="1474931" y="23774"/>
+                <a:pt x="1211601" y="16002"/>
               </a:lnTo>
             </a:path>
           </a:pathLst>
@@ -9024,8 +9027,8 @@
         </a:p>
       </dsp:txBody>
       <dsp:txXfrm>
-        <a:off x="10111304" y="4703654"/>
-        <a:ext cx="281158" cy="368732"/>
+        <a:off x="9829816" y="5547842"/>
+        <a:ext cx="287755" cy="302900"/>
       </dsp:txXfrm>
     </dsp:sp>
     <dsp:sp modelId="{778776B0-6F5E-4A58-93D8-59BB3630F525}">
@@ -9035,8 +9038,8 @@
       </dsp:nvSpPr>
       <dsp:spPr>
         <a:xfrm>
-          <a:off x="10976528" y="4613140"/>
-          <a:ext cx="1177764" cy="275926"/>
+          <a:off x="10445193" y="5181758"/>
+          <a:ext cx="1651388" cy="274324"/>
         </a:xfrm>
         <a:prstGeom prst="roundRect">
           <a:avLst>
@@ -9095,12 +9098,12 @@
         </a:fontRef>
       </dsp:style>
       <dsp:txBody>
-        <a:bodyPr spcFirstLastPara="0" vert="horz" wrap="square" lIns="8255" tIns="8255" rIns="8255" bIns="8255" numCol="1" spcCol="1270" anchor="ctr" anchorCtr="0">
+        <a:bodyPr spcFirstLastPara="0" vert="horz" wrap="square" lIns="8890" tIns="8890" rIns="8890" bIns="8890" numCol="1" spcCol="1270" anchor="ctr" anchorCtr="0">
           <a:noAutofit/>
         </a:bodyPr>
         <a:lstStyle/>
         <a:p>
-          <a:pPr marL="0" lvl="0" indent="0" algn="ctr" defTabSz="577850">
+          <a:pPr marL="0" lvl="0" indent="0" algn="ctr" defTabSz="622300">
             <a:lnSpc>
               <a:spcPct val="90000"/>
             </a:lnSpc>
@@ -9113,7 +9116,7 @@
             <a:buNone/>
           </a:pPr>
           <a:r>
-            <a:rPr lang="en-US" sz="1300" b="1" kern="1200" dirty="0">
+            <a:rPr lang="en-US" sz="1400" b="1" kern="1200" dirty="0">
               <a:solidFill>
                 <a:srgbClr val="00B0F0"/>
               </a:solidFill>
@@ -9121,31 +9124,31 @@
             <a:t>A</a:t>
           </a:r>
           <a:r>
-            <a:rPr lang="en-US" sz="1300" kern="1200" dirty="0"/>
+            <a:rPr lang="en-US" sz="1400" kern="1200" dirty="0"/>
             <a:t> </a:t>
           </a:r>
           <a:r>
-            <a:rPr lang="en-CA" sz="1300" i="1" kern="1200" dirty="0"/>
+            <a:rPr lang="en-CA" sz="1400" i="1" kern="1200" dirty="0"/>
             <a:t>Equals</a:t>
           </a:r>
           <a:r>
-            <a:rPr lang="en-CA" sz="1300" kern="1200" dirty="0"/>
+            <a:rPr lang="en-CA" sz="1400" kern="1200" dirty="0"/>
             <a:t> </a:t>
           </a:r>
           <a:r>
-            <a:rPr lang="en-US" sz="1300" b="1" kern="1200" dirty="0">
+            <a:rPr lang="en-US" sz="1400" b="1" kern="1200" dirty="0">
               <a:solidFill>
                 <a:srgbClr val="00B050"/>
               </a:solidFill>
             </a:rPr>
             <a:t>B</a:t>
           </a:r>
-          <a:endParaRPr lang="en-CA" sz="1300" kern="1200" dirty="0"/>
+          <a:endParaRPr lang="en-CA" sz="1400" kern="1200" dirty="0"/>
         </a:p>
       </dsp:txBody>
       <dsp:txXfrm>
-        <a:off x="10984610" y="4621222"/>
-        <a:ext cx="1161600" cy="259762"/>
+        <a:off x="10453228" y="5189793"/>
+        <a:ext cx="1635318" cy="258254"/>
       </dsp:txXfrm>
     </dsp:sp>
     <dsp:sp modelId="{872C3E18-8C9D-4F32-84A6-2F9FD09D9194}">
@@ -9154,9 +9157,9 @@
         <dsp:cNvSpPr/>
       </dsp:nvSpPr>
       <dsp:spPr>
-        <a:xfrm rot="995384">
-          <a:off x="9495666" y="5217728"/>
-          <a:ext cx="1517000" cy="47548"/>
+        <a:xfrm rot="1972068">
+          <a:off x="9410836" y="6373395"/>
+          <a:ext cx="1141446" cy="32004"/>
         </a:xfrm>
         <a:custGeom>
           <a:avLst/>
@@ -9167,18 +9170,18 @@
           <a:pathLst>
             <a:path>
               <a:moveTo>
-                <a:pt x="0" y="23774"/>
+                <a:pt x="0" y="16002"/>
               </a:moveTo>
               <a:lnTo>
-                <a:pt x="596133" y="23774"/>
+                <a:pt x="408423" y="16002"/>
               </a:lnTo>
             </a:path>
             <a:path>
               <a:moveTo>
-                <a:pt x="920866" y="23774"/>
+                <a:pt x="733022" y="16002"/>
               </a:moveTo>
               <a:lnTo>
-                <a:pt x="1517000" y="23774"/>
+                <a:pt x="1141446" y="16002"/>
               </a:lnTo>
             </a:path>
           </a:pathLst>
@@ -9244,8 +9247,8 @@
         </a:p>
       </dsp:txBody>
       <dsp:txXfrm>
-        <a:off x="10091800" y="5051877"/>
-        <a:ext cx="324732" cy="379250"/>
+        <a:off x="9819260" y="6246717"/>
+        <a:ext cx="324598" cy="285361"/>
       </dsp:txXfrm>
     </dsp:sp>
     <dsp:sp modelId="{D0953BFD-A9E5-445A-879D-994B68DDBF16}">
@@ -9255,8 +9258,8 @@
       </dsp:nvSpPr>
       <dsp:spPr>
         <a:xfrm>
-          <a:off x="10981093" y="5320103"/>
-          <a:ext cx="1177764" cy="275926"/>
+          <a:off x="10460923" y="6561968"/>
+          <a:ext cx="1651388" cy="274324"/>
         </a:xfrm>
         <a:prstGeom prst="roundRect">
           <a:avLst>
@@ -9315,12 +9318,12 @@
         </a:fontRef>
       </dsp:style>
       <dsp:txBody>
-        <a:bodyPr spcFirstLastPara="0" vert="horz" wrap="square" lIns="8255" tIns="8255" rIns="8255" bIns="8255" numCol="1" spcCol="1270" anchor="ctr" anchorCtr="0">
+        <a:bodyPr spcFirstLastPara="0" vert="horz" wrap="square" lIns="8890" tIns="8890" rIns="8890" bIns="8890" numCol="1" spcCol="1270" anchor="ctr" anchorCtr="0">
           <a:noAutofit/>
         </a:bodyPr>
         <a:lstStyle/>
         <a:p>
-          <a:pPr marL="0" lvl="0" indent="0" algn="ctr" defTabSz="577850">
+          <a:pPr marL="0" lvl="0" indent="0" algn="ctr" defTabSz="622300">
             <a:lnSpc>
               <a:spcPct val="90000"/>
             </a:lnSpc>
@@ -9333,7 +9336,7 @@
             <a:buNone/>
           </a:pPr>
           <a:r>
-            <a:rPr lang="en-US" sz="1300" b="1" kern="1200" dirty="0">
+            <a:rPr lang="en-US" sz="1400" b="1" kern="1200" dirty="0">
               <a:solidFill>
                 <a:srgbClr val="00B0F0"/>
               </a:solidFill>
@@ -9341,31 +9344,31 @@
             <a:t>A</a:t>
           </a:r>
           <a:r>
-            <a:rPr lang="en-US" sz="1300" kern="1200" dirty="0"/>
+            <a:rPr lang="en-US" sz="1400" kern="1200" dirty="0"/>
             <a:t> </a:t>
           </a:r>
           <a:r>
-            <a:rPr lang="en-CA" sz="1300" i="1" kern="1200" dirty="0"/>
+            <a:rPr lang="en-CA" sz="1400" i="1" kern="1200" dirty="0"/>
             <a:t>Partitions</a:t>
           </a:r>
           <a:r>
-            <a:rPr lang="en-CA" sz="1300" kern="1200" dirty="0"/>
+            <a:rPr lang="en-CA" sz="1400" kern="1200" dirty="0"/>
             <a:t> </a:t>
           </a:r>
           <a:r>
-            <a:rPr lang="en-US" sz="1300" b="1" kern="1200" dirty="0">
+            <a:rPr lang="en-US" sz="1400" b="1" kern="1200" dirty="0">
               <a:solidFill>
                 <a:srgbClr val="00B050"/>
               </a:solidFill>
             </a:rPr>
             <a:t>B</a:t>
           </a:r>
-          <a:endParaRPr lang="en-CA" sz="1300" kern="1200" dirty="0"/>
+          <a:endParaRPr lang="en-CA" sz="1400" kern="1200" dirty="0"/>
         </a:p>
       </dsp:txBody>
       <dsp:txXfrm>
-        <a:off x="10989175" y="5328185"/>
-        <a:ext cx="1161600" cy="259762"/>
+        <a:off x="10468958" y="6570003"/>
+        <a:ext cx="1635318" cy="258254"/>
       </dsp:txXfrm>
     </dsp:sp>
     <dsp:sp modelId="{BF03BE95-0191-487A-81D4-7B1464A84271}">
@@ -9374,9 +9377,9 @@
         <dsp:cNvSpPr/>
       </dsp:nvSpPr>
       <dsp:spPr>
-        <a:xfrm rot="1340762">
-          <a:off x="4064660" y="5299042"/>
-          <a:ext cx="1566959" cy="47548"/>
+        <a:xfrm rot="1894213">
+          <a:off x="4153343" y="6207345"/>
+          <a:ext cx="1067391" cy="32004"/>
         </a:xfrm>
         <a:custGeom>
           <a:avLst/>
@@ -9387,18 +9390,18 @@
           <a:pathLst>
             <a:path>
               <a:moveTo>
-                <a:pt x="0" y="23774"/>
+                <a:pt x="0" y="16002"/>
               </a:moveTo>
               <a:lnTo>
-                <a:pt x="615766" y="23774"/>
+                <a:pt x="369417" y="16002"/>
               </a:lnTo>
             </a:path>
             <a:path>
               <a:moveTo>
-                <a:pt x="951193" y="23774"/>
+                <a:pt x="697974" y="16002"/>
               </a:moveTo>
               <a:lnTo>
-                <a:pt x="1566959" y="23774"/>
+                <a:pt x="1067391" y="16002"/>
               </a:lnTo>
             </a:path>
           </a:pathLst>
@@ -9464,8 +9467,8 @@
         </a:p>
       </dsp:txBody>
       <dsp:txXfrm>
-        <a:off x="4680426" y="5126946"/>
-        <a:ext cx="335427" cy="391739"/>
+        <a:off x="4522761" y="6089924"/>
+        <a:ext cx="328556" cy="266847"/>
       </dsp:txXfrm>
     </dsp:sp>
     <dsp:sp modelId="{C0A2D960-AF5A-445D-AE5F-800B8AC365D3}">
@@ -9475,8 +9478,8 @@
       </dsp:nvSpPr>
       <dsp:spPr>
         <a:xfrm>
-          <a:off x="5572784" y="5482732"/>
-          <a:ext cx="1309468" cy="275926"/>
+          <a:off x="5141748" y="6365598"/>
+          <a:ext cx="1651388" cy="274324"/>
         </a:xfrm>
         <a:prstGeom prst="roundRect">
           <a:avLst>
@@ -9535,12 +9538,12 @@
         </a:fontRef>
       </dsp:style>
       <dsp:txBody>
-        <a:bodyPr spcFirstLastPara="0" vert="horz" wrap="square" lIns="8255" tIns="8255" rIns="8255" bIns="8255" numCol="1" spcCol="1270" anchor="ctr" anchorCtr="0">
+        <a:bodyPr spcFirstLastPara="0" vert="horz" wrap="square" lIns="8890" tIns="8890" rIns="8890" bIns="8890" numCol="1" spcCol="1270" anchor="ctr" anchorCtr="0">
           <a:noAutofit/>
         </a:bodyPr>
         <a:lstStyle/>
         <a:p>
-          <a:pPr marL="0" lvl="0" indent="0" algn="ctr" defTabSz="577850">
+          <a:pPr marL="0" lvl="0" indent="0" algn="ctr" defTabSz="622300">
             <a:lnSpc>
               <a:spcPct val="90000"/>
             </a:lnSpc>
@@ -9553,7 +9556,7 @@
             <a:buNone/>
           </a:pPr>
           <a:r>
-            <a:rPr lang="en-US" sz="1300" b="1" kern="1200" dirty="0">
+            <a:rPr lang="en-US" sz="1400" b="1" kern="1200" dirty="0">
               <a:solidFill>
                 <a:srgbClr val="00B0F0"/>
               </a:solidFill>
@@ -9561,31 +9564,31 @@
             <a:t>A</a:t>
           </a:r>
           <a:r>
-            <a:rPr lang="en-US" sz="1300" kern="1200" dirty="0"/>
+            <a:rPr lang="en-US" sz="1400" kern="1200" dirty="0"/>
             <a:t> </a:t>
           </a:r>
           <a:r>
-            <a:rPr lang="en-CA" sz="1300" i="1" kern="1200" dirty="0"/>
+            <a:rPr lang="en-CA" sz="1400" i="1" kern="1200" dirty="0"/>
             <a:t>Overlaps</a:t>
           </a:r>
           <a:r>
-            <a:rPr lang="en-CA" sz="1300" kern="1200" dirty="0"/>
+            <a:rPr lang="en-CA" sz="1400" kern="1200" dirty="0"/>
             <a:t> </a:t>
           </a:r>
           <a:r>
-            <a:rPr lang="en-US" sz="1300" b="1" kern="1200" dirty="0">
+            <a:rPr lang="en-US" sz="1400" b="1" kern="1200" dirty="0">
               <a:solidFill>
                 <a:srgbClr val="00B050"/>
               </a:solidFill>
             </a:rPr>
             <a:t>B</a:t>
           </a:r>
-          <a:endParaRPr lang="en-CA" sz="1300" kern="1200" dirty="0"/>
+          <a:endParaRPr lang="en-CA" sz="1400" kern="1200" dirty="0"/>
         </a:p>
       </dsp:txBody>
       <dsp:txXfrm>
-        <a:off x="5580866" y="5490814"/>
-        <a:ext cx="1293304" cy="259762"/>
+        <a:off x="5149783" y="6373633"/>
+        <a:ext cx="1635318" cy="258254"/>
       </dsp:txXfrm>
     </dsp:sp>
   </dsp:spTree>
@@ -15623,6 +15626,440 @@
 </dgm:styleDef>
 </file>
 
+<file path=ppt/notesMasters/notesMaster1.xml><?xml version="1.0" encoding="utf-8"?>
+<p:notesMaster xmlns:a="http://schemas.openxmlformats.org/drawingml/2006/main" xmlns:r="http://schemas.openxmlformats.org/officeDocument/2006/relationships" xmlns:p="http://schemas.openxmlformats.org/presentationml/2006/main">
+  <p:cSld>
+    <p:bg>
+      <p:bgRef idx="1001">
+        <a:schemeClr val="bg1"/>
+      </p:bgRef>
+    </p:bg>
+    <p:spTree>
+      <p:nvGrpSpPr>
+        <p:cNvPr id="1" name=""/>
+        <p:cNvGrpSpPr/>
+        <p:nvPr/>
+      </p:nvGrpSpPr>
+      <p:grpSpPr>
+        <a:xfrm>
+          <a:off x="0" y="0"/>
+          <a:ext cx="0" cy="0"/>
+          <a:chOff x="0" y="0"/>
+          <a:chExt cx="0" cy="0"/>
+        </a:xfrm>
+      </p:grpSpPr>
+      <p:sp>
+        <p:nvSpPr>
+          <p:cNvPr id="2" name="Header Placeholder 1"/>
+          <p:cNvSpPr>
+            <a:spLocks noGrp="1"/>
+          </p:cNvSpPr>
+          <p:nvPr>
+            <p:ph type="hdr" sz="quarter"/>
+          </p:nvPr>
+        </p:nvSpPr>
+        <p:spPr>
+          <a:xfrm>
+            <a:off x="0" y="0"/>
+            <a:ext cx="2971800" cy="458788"/>
+          </a:xfrm>
+          <a:prstGeom prst="rect">
+            <a:avLst/>
+          </a:prstGeom>
+        </p:spPr>
+        <p:txBody>
+          <a:bodyPr vert="horz" lIns="91440" tIns="45720" rIns="91440" bIns="45720" rtlCol="0"/>
+          <a:lstStyle>
+            <a:lvl1pPr algn="l">
+              <a:defRPr sz="1200"/>
+            </a:lvl1pPr>
+          </a:lstStyle>
+          <a:p>
+            <a:endParaRPr lang="en-CA"/>
+          </a:p>
+        </p:txBody>
+      </p:sp>
+      <p:sp>
+        <p:nvSpPr>
+          <p:cNvPr id="3" name="Date Placeholder 2"/>
+          <p:cNvSpPr>
+            <a:spLocks noGrp="1"/>
+          </p:cNvSpPr>
+          <p:nvPr>
+            <p:ph type="dt" idx="1"/>
+          </p:nvPr>
+        </p:nvSpPr>
+        <p:spPr>
+          <a:xfrm>
+            <a:off x="3884613" y="0"/>
+            <a:ext cx="2971800" cy="458788"/>
+          </a:xfrm>
+          <a:prstGeom prst="rect">
+            <a:avLst/>
+          </a:prstGeom>
+        </p:spPr>
+        <p:txBody>
+          <a:bodyPr vert="horz" lIns="91440" tIns="45720" rIns="91440" bIns="45720" rtlCol="0"/>
+          <a:lstStyle>
+            <a:lvl1pPr algn="r">
+              <a:defRPr sz="1200"/>
+            </a:lvl1pPr>
+          </a:lstStyle>
+          <a:p>
+            <a:fld id="{DC4B4FD6-A285-4B47-84E5-E2C72BD48153}" type="datetimeFigureOut">
+              <a:rPr lang="en-CA" smtClean="0"/>
+              <a:t>2025-02-02</a:t>
+            </a:fld>
+            <a:endParaRPr lang="en-CA"/>
+          </a:p>
+        </p:txBody>
+      </p:sp>
+      <p:sp>
+        <p:nvSpPr>
+          <p:cNvPr id="4" name="Slide Image Placeholder 3"/>
+          <p:cNvSpPr>
+            <a:spLocks noGrp="1" noRot="1" noChangeAspect="1"/>
+          </p:cNvSpPr>
+          <p:nvPr>
+            <p:ph type="sldImg" idx="2"/>
+          </p:nvPr>
+        </p:nvSpPr>
+        <p:spPr>
+          <a:xfrm>
+            <a:off x="685800" y="1143000"/>
+            <a:ext cx="5486400" cy="3086100"/>
+          </a:xfrm>
+          <a:prstGeom prst="rect">
+            <a:avLst/>
+          </a:prstGeom>
+          <a:noFill/>
+          <a:ln w="12700">
+            <a:solidFill>
+              <a:prstClr val="black"/>
+            </a:solidFill>
+          </a:ln>
+        </p:spPr>
+        <p:txBody>
+          <a:bodyPr vert="horz" lIns="91440" tIns="45720" rIns="91440" bIns="45720" rtlCol="0" anchor="ctr"/>
+          <a:lstStyle/>
+          <a:p>
+            <a:endParaRPr lang="en-CA"/>
+          </a:p>
+        </p:txBody>
+      </p:sp>
+      <p:sp>
+        <p:nvSpPr>
+          <p:cNvPr id="5" name="Notes Placeholder 4"/>
+          <p:cNvSpPr>
+            <a:spLocks noGrp="1"/>
+          </p:cNvSpPr>
+          <p:nvPr>
+            <p:ph type="body" sz="quarter" idx="3"/>
+          </p:nvPr>
+        </p:nvSpPr>
+        <p:spPr>
+          <a:xfrm>
+            <a:off x="685800" y="4400550"/>
+            <a:ext cx="5486400" cy="3600450"/>
+          </a:xfrm>
+          <a:prstGeom prst="rect">
+            <a:avLst/>
+          </a:prstGeom>
+        </p:spPr>
+        <p:txBody>
+          <a:bodyPr vert="horz" lIns="91440" tIns="45720" rIns="91440" bIns="45720" rtlCol="0"/>
+          <a:lstStyle/>
+          <a:p>
+            <a:pPr lvl="0"/>
+            <a:r>
+              <a:rPr lang="en-US"/>
+              <a:t>Click to edit Master text styles</a:t>
+            </a:r>
+          </a:p>
+          <a:p>
+            <a:pPr lvl="1"/>
+            <a:r>
+              <a:rPr lang="en-US"/>
+              <a:t>Second level</a:t>
+            </a:r>
+          </a:p>
+          <a:p>
+            <a:pPr lvl="2"/>
+            <a:r>
+              <a:rPr lang="en-US"/>
+              <a:t>Third level</a:t>
+            </a:r>
+          </a:p>
+          <a:p>
+            <a:pPr lvl="3"/>
+            <a:r>
+              <a:rPr lang="en-US"/>
+              <a:t>Fourth level</a:t>
+            </a:r>
+          </a:p>
+          <a:p>
+            <a:pPr lvl="4"/>
+            <a:r>
+              <a:rPr lang="en-US"/>
+              <a:t>Fifth level</a:t>
+            </a:r>
+            <a:endParaRPr lang="en-CA"/>
+          </a:p>
+        </p:txBody>
+      </p:sp>
+      <p:sp>
+        <p:nvSpPr>
+          <p:cNvPr id="6" name="Footer Placeholder 5"/>
+          <p:cNvSpPr>
+            <a:spLocks noGrp="1"/>
+          </p:cNvSpPr>
+          <p:nvPr>
+            <p:ph type="ftr" sz="quarter" idx="4"/>
+          </p:nvPr>
+        </p:nvSpPr>
+        <p:spPr>
+          <a:xfrm>
+            <a:off x="0" y="8685213"/>
+            <a:ext cx="2971800" cy="458787"/>
+          </a:xfrm>
+          <a:prstGeom prst="rect">
+            <a:avLst/>
+          </a:prstGeom>
+        </p:spPr>
+        <p:txBody>
+          <a:bodyPr vert="horz" lIns="91440" tIns="45720" rIns="91440" bIns="45720" rtlCol="0" anchor="b"/>
+          <a:lstStyle>
+            <a:lvl1pPr algn="l">
+              <a:defRPr sz="1200"/>
+            </a:lvl1pPr>
+          </a:lstStyle>
+          <a:p>
+            <a:endParaRPr lang="en-CA"/>
+          </a:p>
+        </p:txBody>
+      </p:sp>
+      <p:sp>
+        <p:nvSpPr>
+          <p:cNvPr id="7" name="Slide Number Placeholder 6"/>
+          <p:cNvSpPr>
+            <a:spLocks noGrp="1"/>
+          </p:cNvSpPr>
+          <p:nvPr>
+            <p:ph type="sldNum" sz="quarter" idx="5"/>
+          </p:nvPr>
+        </p:nvSpPr>
+        <p:spPr>
+          <a:xfrm>
+            <a:off x="3884613" y="8685213"/>
+            <a:ext cx="2971800" cy="458787"/>
+          </a:xfrm>
+          <a:prstGeom prst="rect">
+            <a:avLst/>
+          </a:prstGeom>
+        </p:spPr>
+        <p:txBody>
+          <a:bodyPr vert="horz" lIns="91440" tIns="45720" rIns="91440" bIns="45720" rtlCol="0" anchor="b"/>
+          <a:lstStyle>
+            <a:lvl1pPr algn="r">
+              <a:defRPr sz="1200"/>
+            </a:lvl1pPr>
+          </a:lstStyle>
+          <a:p>
+            <a:fld id="{57E797E7-3CBE-42BD-8165-3C82D52913B1}" type="slidenum">
+              <a:rPr lang="en-CA" smtClean="0"/>
+              <a:t>‹#›</a:t>
+            </a:fld>
+            <a:endParaRPr lang="en-CA"/>
+          </a:p>
+        </p:txBody>
+      </p:sp>
+    </p:spTree>
+    <p:extLst>
+      <p:ext uri="{BB962C8B-B14F-4D97-AF65-F5344CB8AC3E}">
+        <p14:creationId xmlns:p14="http://schemas.microsoft.com/office/powerpoint/2010/main" val="1415603134"/>
+      </p:ext>
+    </p:extLst>
+  </p:cSld>
+  <p:clrMap bg1="lt1" tx1="dk1" bg2="lt2" tx2="dk2" accent1="accent1" accent2="accent2" accent3="accent3" accent4="accent4" accent5="accent5" accent6="accent6" hlink="hlink" folHlink="folHlink"/>
+  <p:notesStyle>
+    <a:lvl1pPr marL="0" algn="l" defTabSz="914400" rtl="0" eaLnBrk="1" latinLnBrk="0" hangingPunct="1">
+      <a:defRPr sz="1200" kern="1200">
+        <a:solidFill>
+          <a:schemeClr val="tx1"/>
+        </a:solidFill>
+        <a:latin typeface="+mn-lt"/>
+        <a:ea typeface="+mn-ea"/>
+        <a:cs typeface="+mn-cs"/>
+      </a:defRPr>
+    </a:lvl1pPr>
+    <a:lvl2pPr marL="457200" algn="l" defTabSz="914400" rtl="0" eaLnBrk="1" latinLnBrk="0" hangingPunct="1">
+      <a:defRPr sz="1200" kern="1200">
+        <a:solidFill>
+          <a:schemeClr val="tx1"/>
+        </a:solidFill>
+        <a:latin typeface="+mn-lt"/>
+        <a:ea typeface="+mn-ea"/>
+        <a:cs typeface="+mn-cs"/>
+      </a:defRPr>
+    </a:lvl2pPr>
+    <a:lvl3pPr marL="914400" algn="l" defTabSz="914400" rtl="0" eaLnBrk="1" latinLnBrk="0" hangingPunct="1">
+      <a:defRPr sz="1200" kern="1200">
+        <a:solidFill>
+          <a:schemeClr val="tx1"/>
+        </a:solidFill>
+        <a:latin typeface="+mn-lt"/>
+        <a:ea typeface="+mn-ea"/>
+        <a:cs typeface="+mn-cs"/>
+      </a:defRPr>
+    </a:lvl3pPr>
+    <a:lvl4pPr marL="1371600" algn="l" defTabSz="914400" rtl="0" eaLnBrk="1" latinLnBrk="0" hangingPunct="1">
+      <a:defRPr sz="1200" kern="1200">
+        <a:solidFill>
+          <a:schemeClr val="tx1"/>
+        </a:solidFill>
+        <a:latin typeface="+mn-lt"/>
+        <a:ea typeface="+mn-ea"/>
+        <a:cs typeface="+mn-cs"/>
+      </a:defRPr>
+    </a:lvl4pPr>
+    <a:lvl5pPr marL="1828800" algn="l" defTabSz="914400" rtl="0" eaLnBrk="1" latinLnBrk="0" hangingPunct="1">
+      <a:defRPr sz="1200" kern="1200">
+        <a:solidFill>
+          <a:schemeClr val="tx1"/>
+        </a:solidFill>
+        <a:latin typeface="+mn-lt"/>
+        <a:ea typeface="+mn-ea"/>
+        <a:cs typeface="+mn-cs"/>
+      </a:defRPr>
+    </a:lvl5pPr>
+    <a:lvl6pPr marL="2286000" algn="l" defTabSz="914400" rtl="0" eaLnBrk="1" latinLnBrk="0" hangingPunct="1">
+      <a:defRPr sz="1200" kern="1200">
+        <a:solidFill>
+          <a:schemeClr val="tx1"/>
+        </a:solidFill>
+        <a:latin typeface="+mn-lt"/>
+        <a:ea typeface="+mn-ea"/>
+        <a:cs typeface="+mn-cs"/>
+      </a:defRPr>
+    </a:lvl6pPr>
+    <a:lvl7pPr marL="2743200" algn="l" defTabSz="914400" rtl="0" eaLnBrk="1" latinLnBrk="0" hangingPunct="1">
+      <a:defRPr sz="1200" kern="1200">
+        <a:solidFill>
+          <a:schemeClr val="tx1"/>
+        </a:solidFill>
+        <a:latin typeface="+mn-lt"/>
+        <a:ea typeface="+mn-ea"/>
+        <a:cs typeface="+mn-cs"/>
+      </a:defRPr>
+    </a:lvl7pPr>
+    <a:lvl8pPr marL="3200400" algn="l" defTabSz="914400" rtl="0" eaLnBrk="1" latinLnBrk="0" hangingPunct="1">
+      <a:defRPr sz="1200" kern="1200">
+        <a:solidFill>
+          <a:schemeClr val="tx1"/>
+        </a:solidFill>
+        <a:latin typeface="+mn-lt"/>
+        <a:ea typeface="+mn-ea"/>
+        <a:cs typeface="+mn-cs"/>
+      </a:defRPr>
+    </a:lvl8pPr>
+    <a:lvl9pPr marL="3657600" algn="l" defTabSz="914400" rtl="0" eaLnBrk="1" latinLnBrk="0" hangingPunct="1">
+      <a:defRPr sz="1200" kern="1200">
+        <a:solidFill>
+          <a:schemeClr val="tx1"/>
+        </a:solidFill>
+        <a:latin typeface="+mn-lt"/>
+        <a:ea typeface="+mn-ea"/>
+        <a:cs typeface="+mn-cs"/>
+      </a:defRPr>
+    </a:lvl9pPr>
+  </p:notesStyle>
+</p:notesMaster>
+</file>
+
+<file path=ppt/notesSlides/notesSlide1.xml><?xml version="1.0" encoding="utf-8"?>
+<p:notes xmlns:a="http://schemas.openxmlformats.org/drawingml/2006/main" xmlns:r="http://schemas.openxmlformats.org/officeDocument/2006/relationships" xmlns:p="http://schemas.openxmlformats.org/presentationml/2006/main">
+  <p:cSld>
+    <p:spTree>
+      <p:nvGrpSpPr>
+        <p:cNvPr id="1" name=""/>
+        <p:cNvGrpSpPr/>
+        <p:nvPr/>
+      </p:nvGrpSpPr>
+      <p:grpSpPr>
+        <a:xfrm>
+          <a:off x="0" y="0"/>
+          <a:ext cx="0" cy="0"/>
+          <a:chOff x="0" y="0"/>
+          <a:chExt cx="0" cy="0"/>
+        </a:xfrm>
+      </p:grpSpPr>
+      <p:sp>
+        <p:nvSpPr>
+          <p:cNvPr id="2" name="Slide Image Placeholder 1"/>
+          <p:cNvSpPr>
+            <a:spLocks noGrp="1" noRot="1" noChangeAspect="1"/>
+          </p:cNvSpPr>
+          <p:nvPr>
+            <p:ph type="sldImg"/>
+          </p:nvPr>
+        </p:nvSpPr>
+        <p:spPr/>
+      </p:sp>
+      <p:sp>
+        <p:nvSpPr>
+          <p:cNvPr id="3" name="Notes Placeholder 2"/>
+          <p:cNvSpPr>
+            <a:spLocks noGrp="1"/>
+          </p:cNvSpPr>
+          <p:nvPr>
+            <p:ph type="body" idx="1"/>
+          </p:nvPr>
+        </p:nvSpPr>
+        <p:spPr/>
+        <p:txBody>
+          <a:bodyPr/>
+          <a:lstStyle/>
+          <a:p>
+            <a:endParaRPr lang="en-CA" dirty="0"/>
+          </a:p>
+        </p:txBody>
+      </p:sp>
+      <p:sp>
+        <p:nvSpPr>
+          <p:cNvPr id="4" name="Slide Number Placeholder 3"/>
+          <p:cNvSpPr>
+            <a:spLocks noGrp="1"/>
+          </p:cNvSpPr>
+          <p:nvPr>
+            <p:ph type="sldNum" sz="quarter" idx="5"/>
+          </p:nvPr>
+        </p:nvSpPr>
+        <p:spPr/>
+        <p:txBody>
+          <a:bodyPr/>
+          <a:lstStyle/>
+          <a:p>
+            <a:fld id="{57E797E7-3CBE-42BD-8165-3C82D52913B1}" type="slidenum">
+              <a:rPr lang="en-CA" smtClean="0"/>
+              <a:t>1</a:t>
+            </a:fld>
+            <a:endParaRPr lang="en-CA"/>
+          </a:p>
+        </p:txBody>
+      </p:sp>
+    </p:spTree>
+    <p:extLst>
+      <p:ext uri="{BB962C8B-B14F-4D97-AF65-F5344CB8AC3E}">
+        <p14:creationId xmlns:p14="http://schemas.microsoft.com/office/powerpoint/2010/main" val="748363133"/>
+      </p:ext>
+    </p:extLst>
+  </p:cSld>
+  <p:clrMapOvr>
+    <a:masterClrMapping/>
+  </p:clrMapOvr>
+</p:notes>
+</file>
+
 <file path=ppt/slideLayouts/slideLayout1.xml><?xml version="1.0" encoding="utf-8"?>
 <p:sldLayout xmlns:a="http://schemas.openxmlformats.org/drawingml/2006/main" xmlns:r="http://schemas.openxmlformats.org/officeDocument/2006/relationships" xmlns:p="http://schemas.openxmlformats.org/presentationml/2006/main" type="title" preserve="1">
   <p:cSld name="Title Slide">
@@ -15772,7 +16209,7 @@
           <a:p>
             <a:fld id="{6734E7D0-3955-4B33-82AD-D53929A7269C}" type="datetimeFigureOut">
               <a:rPr lang="en-CA" smtClean="0"/>
-              <a:t>2025-01-17</a:t>
+              <a:t>2025-02-02</a:t>
             </a:fld>
             <a:endParaRPr lang="en-CA" dirty="0"/>
           </a:p>
@@ -15972,7 +16409,7 @@
           <a:p>
             <a:fld id="{6734E7D0-3955-4B33-82AD-D53929A7269C}" type="datetimeFigureOut">
               <a:rPr lang="en-CA" smtClean="0"/>
-              <a:t>2025-01-17</a:t>
+              <a:t>2025-02-02</a:t>
             </a:fld>
             <a:endParaRPr lang="en-CA" dirty="0"/>
           </a:p>
@@ -16182,7 +16619,7 @@
           <a:p>
             <a:fld id="{6734E7D0-3955-4B33-82AD-D53929A7269C}" type="datetimeFigureOut">
               <a:rPr lang="en-CA" smtClean="0"/>
-              <a:t>2025-01-17</a:t>
+              <a:t>2025-02-02</a:t>
             </a:fld>
             <a:endParaRPr lang="en-CA" dirty="0"/>
           </a:p>
@@ -16382,7 +16819,7 @@
           <a:p>
             <a:fld id="{6734E7D0-3955-4B33-82AD-D53929A7269C}" type="datetimeFigureOut">
               <a:rPr lang="en-CA" smtClean="0"/>
-              <a:t>2025-01-17</a:t>
+              <a:t>2025-02-02</a:t>
             </a:fld>
             <a:endParaRPr lang="en-CA" dirty="0"/>
           </a:p>
@@ -16658,7 +17095,7 @@
           <a:p>
             <a:fld id="{6734E7D0-3955-4B33-82AD-D53929A7269C}" type="datetimeFigureOut">
               <a:rPr lang="en-CA" smtClean="0"/>
-              <a:t>2025-01-17</a:t>
+              <a:t>2025-02-02</a:t>
             </a:fld>
             <a:endParaRPr lang="en-CA" dirty="0"/>
           </a:p>
@@ -16926,7 +17363,7 @@
           <a:p>
             <a:fld id="{6734E7D0-3955-4B33-82AD-D53929A7269C}" type="datetimeFigureOut">
               <a:rPr lang="en-CA" smtClean="0"/>
-              <a:t>2025-01-17</a:t>
+              <a:t>2025-02-02</a:t>
             </a:fld>
             <a:endParaRPr lang="en-CA" dirty="0"/>
           </a:p>
@@ -17341,7 +17778,7 @@
           <a:p>
             <a:fld id="{6734E7D0-3955-4B33-82AD-D53929A7269C}" type="datetimeFigureOut">
               <a:rPr lang="en-CA" smtClean="0"/>
-              <a:t>2025-01-17</a:t>
+              <a:t>2025-02-02</a:t>
             </a:fld>
             <a:endParaRPr lang="en-CA" dirty="0"/>
           </a:p>
@@ -17483,7 +17920,7 @@
           <a:p>
             <a:fld id="{6734E7D0-3955-4B33-82AD-D53929A7269C}" type="datetimeFigureOut">
               <a:rPr lang="en-CA" smtClean="0"/>
-              <a:t>2025-01-17</a:t>
+              <a:t>2025-02-02</a:t>
             </a:fld>
             <a:endParaRPr lang="en-CA" dirty="0"/>
           </a:p>
@@ -17596,7 +18033,7 @@
           <a:p>
             <a:fld id="{6734E7D0-3955-4B33-82AD-D53929A7269C}" type="datetimeFigureOut">
               <a:rPr lang="en-CA" smtClean="0"/>
-              <a:t>2025-01-17</a:t>
+              <a:t>2025-02-02</a:t>
             </a:fld>
             <a:endParaRPr lang="en-CA" dirty="0"/>
           </a:p>
@@ -17909,7 +18346,7 @@
           <a:p>
             <a:fld id="{6734E7D0-3955-4B33-82AD-D53929A7269C}" type="datetimeFigureOut">
               <a:rPr lang="en-CA" smtClean="0"/>
-              <a:t>2025-01-17</a:t>
+              <a:t>2025-02-02</a:t>
             </a:fld>
             <a:endParaRPr lang="en-CA" dirty="0"/>
           </a:p>
@@ -18198,7 +18635,7 @@
           <a:p>
             <a:fld id="{6734E7D0-3955-4B33-82AD-D53929A7269C}" type="datetimeFigureOut">
               <a:rPr lang="en-CA" smtClean="0"/>
-              <a:t>2025-01-17</a:t>
+              <a:t>2025-02-02</a:t>
             </a:fld>
             <a:endParaRPr lang="en-CA" dirty="0"/>
           </a:p>
@@ -18441,7 +18878,7 @@
           <a:p>
             <a:fld id="{6734E7D0-3955-4B33-82AD-D53929A7269C}" type="datetimeFigureOut">
               <a:rPr lang="en-CA" smtClean="0"/>
-              <a:t>2025-01-17</a:t>
+              <a:t>2025-02-02</a:t>
             </a:fld>
             <a:endParaRPr lang="en-CA" dirty="0"/>
           </a:p>
@@ -18877,7 +19314,7 @@
           <p:nvPr>
             <p:extLst>
               <p:ext uri="{D42A27DB-BD31-4B8C-83A1-F6EECF244321}">
-                <p14:modId xmlns:p14="http://schemas.microsoft.com/office/powerpoint/2010/main" val="812926874"/>
+                <p14:modId xmlns:p14="http://schemas.microsoft.com/office/powerpoint/2010/main" val="3376743876"/>
               </p:ext>
             </p:extLst>
           </p:nvPr>
@@ -18888,7 +19325,7 @@
         </p:xfrm>
         <a:graphic>
           <a:graphicData uri="http://schemas.openxmlformats.org/drawingml/2006/diagram">
-            <dgm:relIds xmlns:dgm="http://schemas.openxmlformats.org/drawingml/2006/diagram" xmlns:r="http://schemas.openxmlformats.org/officeDocument/2006/relationships" r:dm="rId2" r:lo="rId3" r:qs="rId4" r:cs="rId5"/>
+            <dgm:relIds xmlns:dgm="http://schemas.openxmlformats.org/drawingml/2006/diagram" xmlns:r="http://schemas.openxmlformats.org/officeDocument/2006/relationships" r:dm="rId3" r:lo="rId4" r:qs="rId5" r:cs="rId6"/>
           </a:graphicData>
         </a:graphic>
       </p:graphicFrame>
@@ -20245,4 +20682,319 @@
     </a:ext>
   </a:extLst>
 </a:theme>
+</file>
+
+<file path=ppt/theme/theme2.xml><?xml version="1.0" encoding="utf-8"?>
+<a:theme xmlns:a="http://schemas.openxmlformats.org/drawingml/2006/main" name="Office Theme">
+  <a:themeElements>
+    <a:clrScheme name="Office">
+      <a:dk1>
+        <a:sysClr val="windowText" lastClr="000000"/>
+      </a:dk1>
+      <a:lt1>
+        <a:sysClr val="window" lastClr="FFFFFF"/>
+      </a:lt1>
+      <a:dk2>
+        <a:srgbClr val="0E2841"/>
+      </a:dk2>
+      <a:lt2>
+        <a:srgbClr val="E8E8E8"/>
+      </a:lt2>
+      <a:accent1>
+        <a:srgbClr val="156082"/>
+      </a:accent1>
+      <a:accent2>
+        <a:srgbClr val="E97132"/>
+      </a:accent2>
+      <a:accent3>
+        <a:srgbClr val="196B24"/>
+      </a:accent3>
+      <a:accent4>
+        <a:srgbClr val="0F9ED5"/>
+      </a:accent4>
+      <a:accent5>
+        <a:srgbClr val="A02B93"/>
+      </a:accent5>
+      <a:accent6>
+        <a:srgbClr val="4EA72E"/>
+      </a:accent6>
+      <a:hlink>
+        <a:srgbClr val="467886"/>
+      </a:hlink>
+      <a:folHlink>
+        <a:srgbClr val="96607D"/>
+      </a:folHlink>
+    </a:clrScheme>
+    <a:fontScheme name="Office">
+      <a:majorFont>
+        <a:latin typeface="Aptos Display" panose="02110004020202020204"/>
+        <a:ea typeface=""/>
+        <a:cs typeface=""/>
+        <a:font script="Jpan" typeface="游ゴシック Light"/>
+        <a:font script="Hang" typeface="맑은 고딕"/>
+        <a:font script="Hans" typeface="等线 Light"/>
+        <a:font script="Hant" typeface="新細明體"/>
+        <a:font script="Arab" typeface="Times New Roman"/>
+        <a:font script="Hebr" typeface="Times New Roman"/>
+        <a:font script="Thai" typeface="Angsana New"/>
+        <a:font script="Ethi" typeface="Nyala"/>
+        <a:font script="Beng" typeface="Vrinda"/>
+        <a:font script="Gujr" typeface="Shruti"/>
+        <a:font script="Khmr" typeface="MoolBoran"/>
+        <a:font script="Knda" typeface="Tunga"/>
+        <a:font script="Guru" typeface="Raavi"/>
+        <a:font script="Cans" typeface="Euphemia"/>
+        <a:font script="Cher" typeface="Plantagenet Cherokee"/>
+        <a:font script="Yiii" typeface="Microsoft Yi Baiti"/>
+        <a:font script="Tibt" typeface="Microsoft Himalaya"/>
+        <a:font script="Thaa" typeface="MV Boli"/>
+        <a:font script="Deva" typeface="Mangal"/>
+        <a:font script="Telu" typeface="Gautami"/>
+        <a:font script="Taml" typeface="Latha"/>
+        <a:font script="Syrc" typeface="Estrangelo Edessa"/>
+        <a:font script="Orya" typeface="Kalinga"/>
+        <a:font script="Mlym" typeface="Kartika"/>
+        <a:font script="Laoo" typeface="DokChampa"/>
+        <a:font script="Sinh" typeface="Iskoola Pota"/>
+        <a:font script="Mong" typeface="Mongolian Baiti"/>
+        <a:font script="Viet" typeface="Times New Roman"/>
+        <a:font script="Uigh" typeface="Microsoft Uighur"/>
+        <a:font script="Geor" typeface="Sylfaen"/>
+        <a:font script="Armn" typeface="Arial"/>
+        <a:font script="Bugi" typeface="Leelawadee UI"/>
+        <a:font script="Bopo" typeface="Microsoft JhengHei"/>
+        <a:font script="Java" typeface="Javanese Text"/>
+        <a:font script="Lisu" typeface="Segoe UI"/>
+        <a:font script="Mymr" typeface="Myanmar Text"/>
+        <a:font script="Nkoo" typeface="Ebrima"/>
+        <a:font script="Olck" typeface="Nirmala UI"/>
+        <a:font script="Osma" typeface="Ebrima"/>
+        <a:font script="Phag" typeface="Phagspa"/>
+        <a:font script="Syrn" typeface="Estrangelo Edessa"/>
+        <a:font script="Syrj" typeface="Estrangelo Edessa"/>
+        <a:font script="Syre" typeface="Estrangelo Edessa"/>
+        <a:font script="Sora" typeface="Nirmala UI"/>
+        <a:font script="Tale" typeface="Microsoft Tai Le"/>
+        <a:font script="Talu" typeface="Microsoft New Tai Lue"/>
+        <a:font script="Tfng" typeface="Ebrima"/>
+      </a:majorFont>
+      <a:minorFont>
+        <a:latin typeface="Aptos" panose="02110004020202020204"/>
+        <a:ea typeface=""/>
+        <a:cs typeface=""/>
+        <a:font script="Jpan" typeface="游ゴシック"/>
+        <a:font script="Hang" typeface="맑은 고딕"/>
+        <a:font script="Hans" typeface="等线"/>
+        <a:font script="Hant" typeface="新細明體"/>
+        <a:font script="Arab" typeface="Arial"/>
+        <a:font script="Hebr" typeface="Arial"/>
+        <a:font script="Thai" typeface="Cordia New"/>
+        <a:font script="Ethi" typeface="Nyala"/>
+        <a:font script="Beng" typeface="Vrinda"/>
+        <a:font script="Gujr" typeface="Shruti"/>
+        <a:font script="Khmr" typeface="DaunPenh"/>
+        <a:font script="Knda" typeface="Tunga"/>
+        <a:font script="Guru" typeface="Raavi"/>
+        <a:font script="Cans" typeface="Euphemia"/>
+        <a:font script="Cher" typeface="Plantagenet Cherokee"/>
+        <a:font script="Yiii" typeface="Microsoft Yi Baiti"/>
+        <a:font script="Tibt" typeface="Microsoft Himalaya"/>
+        <a:font script="Thaa" typeface="MV Boli"/>
+        <a:font script="Deva" typeface="Mangal"/>
+        <a:font script="Telu" typeface="Gautami"/>
+        <a:font script="Taml" typeface="Latha"/>
+        <a:font script="Syrc" typeface="Estrangelo Edessa"/>
+        <a:font script="Orya" typeface="Kalinga"/>
+        <a:font script="Mlym" typeface="Kartika"/>
+        <a:font script="Laoo" typeface="DokChampa"/>
+        <a:font script="Sinh" typeface="Iskoola Pota"/>
+        <a:font script="Mong" typeface="Mongolian Baiti"/>
+        <a:font script="Viet" typeface="Arial"/>
+        <a:font script="Uigh" typeface="Microsoft Uighur"/>
+        <a:font script="Geor" typeface="Sylfaen"/>
+        <a:font script="Armn" typeface="Arial"/>
+        <a:font script="Bugi" typeface="Leelawadee UI"/>
+        <a:font script="Bopo" typeface="Microsoft JhengHei"/>
+        <a:font script="Java" typeface="Javanese Text"/>
+        <a:font script="Lisu" typeface="Segoe UI"/>
+        <a:font script="Mymr" typeface="Myanmar Text"/>
+        <a:font script="Nkoo" typeface="Ebrima"/>
+        <a:font script="Olck" typeface="Nirmala UI"/>
+        <a:font script="Osma" typeface="Ebrima"/>
+        <a:font script="Phag" typeface="Phagspa"/>
+        <a:font script="Syrn" typeface="Estrangelo Edessa"/>
+        <a:font script="Syrj" typeface="Estrangelo Edessa"/>
+        <a:font script="Syre" typeface="Estrangelo Edessa"/>
+        <a:font script="Sora" typeface="Nirmala UI"/>
+        <a:font script="Tale" typeface="Microsoft Tai Le"/>
+        <a:font script="Talu" typeface="Microsoft New Tai Lue"/>
+        <a:font script="Tfng" typeface="Ebrima"/>
+      </a:minorFont>
+    </a:fontScheme>
+    <a:fmtScheme name="Office">
+      <a:fillStyleLst>
+        <a:solidFill>
+          <a:schemeClr val="phClr"/>
+        </a:solidFill>
+        <a:gradFill rotWithShape="1">
+          <a:gsLst>
+            <a:gs pos="0">
+              <a:schemeClr val="phClr">
+                <a:lumMod val="110000"/>
+                <a:satMod val="105000"/>
+                <a:tint val="67000"/>
+              </a:schemeClr>
+            </a:gs>
+            <a:gs pos="50000">
+              <a:schemeClr val="phClr">
+                <a:lumMod val="105000"/>
+                <a:satMod val="103000"/>
+                <a:tint val="73000"/>
+              </a:schemeClr>
+            </a:gs>
+            <a:gs pos="100000">
+              <a:schemeClr val="phClr">
+                <a:lumMod val="105000"/>
+                <a:satMod val="109000"/>
+                <a:tint val="81000"/>
+              </a:schemeClr>
+            </a:gs>
+          </a:gsLst>
+          <a:lin ang="5400000" scaled="0"/>
+        </a:gradFill>
+        <a:gradFill rotWithShape="1">
+          <a:gsLst>
+            <a:gs pos="0">
+              <a:schemeClr val="phClr">
+                <a:satMod val="103000"/>
+                <a:lumMod val="102000"/>
+                <a:tint val="94000"/>
+              </a:schemeClr>
+            </a:gs>
+            <a:gs pos="50000">
+              <a:schemeClr val="phClr">
+                <a:satMod val="110000"/>
+                <a:lumMod val="100000"/>
+                <a:shade val="100000"/>
+              </a:schemeClr>
+            </a:gs>
+            <a:gs pos="100000">
+              <a:schemeClr val="phClr">
+                <a:lumMod val="99000"/>
+                <a:satMod val="120000"/>
+                <a:shade val="78000"/>
+              </a:schemeClr>
+            </a:gs>
+          </a:gsLst>
+          <a:lin ang="5400000" scaled="0"/>
+        </a:gradFill>
+      </a:fillStyleLst>
+      <a:lnStyleLst>
+        <a:ln w="12700" cap="flat" cmpd="sng" algn="ctr">
+          <a:solidFill>
+            <a:schemeClr val="phClr"/>
+          </a:solidFill>
+          <a:prstDash val="solid"/>
+          <a:miter lim="800000"/>
+        </a:ln>
+        <a:ln w="19050" cap="flat" cmpd="sng" algn="ctr">
+          <a:solidFill>
+            <a:schemeClr val="phClr"/>
+          </a:solidFill>
+          <a:prstDash val="solid"/>
+          <a:miter lim="800000"/>
+        </a:ln>
+        <a:ln w="25400" cap="flat" cmpd="sng" algn="ctr">
+          <a:solidFill>
+            <a:schemeClr val="phClr"/>
+          </a:solidFill>
+          <a:prstDash val="solid"/>
+          <a:miter lim="800000"/>
+        </a:ln>
+      </a:lnStyleLst>
+      <a:effectStyleLst>
+        <a:effectStyle>
+          <a:effectLst/>
+        </a:effectStyle>
+        <a:effectStyle>
+          <a:effectLst/>
+        </a:effectStyle>
+        <a:effectStyle>
+          <a:effectLst>
+            <a:outerShdw blurRad="57150" dist="19050" dir="5400000" algn="ctr" rotWithShape="0">
+              <a:srgbClr val="000000">
+                <a:alpha val="63000"/>
+              </a:srgbClr>
+            </a:outerShdw>
+          </a:effectLst>
+        </a:effectStyle>
+      </a:effectStyleLst>
+      <a:bgFillStyleLst>
+        <a:solidFill>
+          <a:schemeClr val="phClr"/>
+        </a:solidFill>
+        <a:solidFill>
+          <a:schemeClr val="phClr">
+            <a:tint val="95000"/>
+            <a:satMod val="170000"/>
+          </a:schemeClr>
+        </a:solidFill>
+        <a:gradFill rotWithShape="1">
+          <a:gsLst>
+            <a:gs pos="0">
+              <a:schemeClr val="phClr">
+                <a:tint val="93000"/>
+                <a:satMod val="150000"/>
+                <a:shade val="98000"/>
+                <a:lumMod val="102000"/>
+              </a:schemeClr>
+            </a:gs>
+            <a:gs pos="50000">
+              <a:schemeClr val="phClr">
+                <a:tint val="98000"/>
+                <a:satMod val="130000"/>
+                <a:shade val="90000"/>
+                <a:lumMod val="103000"/>
+              </a:schemeClr>
+            </a:gs>
+            <a:gs pos="100000">
+              <a:schemeClr val="phClr">
+                <a:shade val="63000"/>
+                <a:satMod val="120000"/>
+              </a:schemeClr>
+            </a:gs>
+          </a:gsLst>
+          <a:lin ang="5400000" scaled="0"/>
+        </a:gradFill>
+      </a:bgFillStyleLst>
+    </a:fmtScheme>
+  </a:themeElements>
+  <a:objectDefaults>
+    <a:lnDef>
+      <a:spPr/>
+      <a:bodyPr/>
+      <a:lstStyle/>
+      <a:style>
+        <a:lnRef idx="2">
+          <a:schemeClr val="accent1"/>
+        </a:lnRef>
+        <a:fillRef idx="0">
+          <a:schemeClr val="accent1"/>
+        </a:fillRef>
+        <a:effectRef idx="1">
+          <a:schemeClr val="accent1"/>
+        </a:effectRef>
+        <a:fontRef idx="minor">
+          <a:schemeClr val="tx1"/>
+        </a:fontRef>
+      </a:style>
+    </a:lnDef>
+  </a:objectDefaults>
+  <a:extraClrSchemeLst/>
+  <a:extLst>
+    <a:ext uri="{05A4C25C-085E-4340-85A3-A5531E510DB2}">
+      <thm15:themeFamily xmlns:thm15="http://schemas.microsoft.com/office/thememl/2012/main" name="Office Theme" id="{2E142A2C-CD16-42D6-873A-C26D2A0506FA}" vid="{1BDDFF52-6CD6-40A5-AB3C-68EB2F1E4D0A}"/>
+    </a:ext>
+  </a:extLst>
+</a:theme>
 </file>
</xml_diff>